<commit_message>
Fixing small issues w/ rmd to pptx
</commit_message>
<xml_diff>
--- a/Slides.pptx
+++ b/Slides.pptx
@@ -119,6 +119,11 @@
       </a:defRPr>
     </a:lvl9pPr>
   </p:defaultTextStyle>
+  <p:extLst>
+    <p:ext uri="{EFAFB233-063F-42B5-8137-9DF3F51BA10A}">
+      <p15:sldGuideLst xmlns:p15="http://schemas.microsoft.com/office/powerpoint/2012/main"/>
+    </p:ext>
+  </p:extLst>
 </p:presentation>
 </file>
 
@@ -139,12 +144,119 @@
           <a:chExt cx="0" cy="0"/>
         </a:xfrm>
       </p:grpSpPr>
+      <p:sp>
+        <p:nvSpPr>
+          <p:cNvPr id="2" name="Title 1">
+            <a:extLst>
+              <a:ext uri="{FF2B5EF4-FFF2-40B4-BE49-F238E27FC236}">
+                <a16:creationId xmlns:a16="http://schemas.microsoft.com/office/drawing/2014/main" id="{D656A5CB-4A43-2BF2-9B14-3172479E030C}"/>
+              </a:ext>
+            </a:extLst>
+          </p:cNvPr>
+          <p:cNvSpPr>
+            <a:spLocks noGrp="1"/>
+          </p:cNvSpPr>
+          <p:nvPr>
+            <p:ph type="ctrTitle"/>
+          </p:nvPr>
+        </p:nvSpPr>
+        <p:spPr>
+          <a:xfrm>
+            <a:off x="1524000" y="1122363"/>
+            <a:ext cx="9144000" cy="2387600"/>
+          </a:xfrm>
+        </p:spPr>
+        <p:txBody>
+          <a:bodyPr anchor="b"/>
+          <a:lstStyle>
+            <a:lvl1pPr algn="ctr">
+              <a:defRPr sz="6000"/>
+            </a:lvl1pPr>
+          </a:lstStyle>
+          <a:p>
+            <a:r>
+              <a:rPr lang="en-US" dirty="0"/>
+              <a:t>Click to edit Master title style</a:t>
+            </a:r>
+          </a:p>
+        </p:txBody>
+      </p:sp>
+      <p:sp>
+        <p:nvSpPr>
+          <p:cNvPr id="3" name="Subtitle 2">
+            <a:extLst>
+              <a:ext uri="{FF2B5EF4-FFF2-40B4-BE49-F238E27FC236}">
+                <a16:creationId xmlns:a16="http://schemas.microsoft.com/office/drawing/2014/main" id="{0558A5BC-1E42-A6CC-5E5E-D6CBCB1062BE}"/>
+              </a:ext>
+            </a:extLst>
+          </p:cNvPr>
+          <p:cNvSpPr>
+            <a:spLocks noGrp="1"/>
+          </p:cNvSpPr>
+          <p:nvPr>
+            <p:ph type="subTitle" idx="1"/>
+          </p:nvPr>
+        </p:nvSpPr>
+        <p:spPr>
+          <a:xfrm>
+            <a:off x="1524000" y="3602038"/>
+            <a:ext cx="9144000" cy="1655762"/>
+          </a:xfrm>
+        </p:spPr>
+        <p:txBody>
+          <a:bodyPr/>
+          <a:lstStyle>
+            <a:lvl1pPr marL="0" indent="0" algn="ctr">
+              <a:buNone/>
+              <a:defRPr sz="2400"/>
+            </a:lvl1pPr>
+            <a:lvl2pPr marL="457200" indent="0" algn="ctr">
+              <a:buNone/>
+              <a:defRPr sz="2000"/>
+            </a:lvl2pPr>
+            <a:lvl3pPr marL="914400" indent="0" algn="ctr">
+              <a:buNone/>
+              <a:defRPr sz="1800"/>
+            </a:lvl3pPr>
+            <a:lvl4pPr marL="1371600" indent="0" algn="ctr">
+              <a:buNone/>
+              <a:defRPr sz="1600"/>
+            </a:lvl4pPr>
+            <a:lvl5pPr marL="1828800" indent="0" algn="ctr">
+              <a:buNone/>
+              <a:defRPr sz="1600"/>
+            </a:lvl5pPr>
+            <a:lvl6pPr marL="2286000" indent="0" algn="ctr">
+              <a:buNone/>
+              <a:defRPr sz="1600"/>
+            </a:lvl6pPr>
+            <a:lvl7pPr marL="2743200" indent="0" algn="ctr">
+              <a:buNone/>
+              <a:defRPr sz="1600"/>
+            </a:lvl7pPr>
+            <a:lvl8pPr marL="3200400" indent="0" algn="ctr">
+              <a:buNone/>
+              <a:defRPr sz="1600"/>
+            </a:lvl8pPr>
+            <a:lvl9pPr marL="3657600" indent="0" algn="ctr">
+              <a:buNone/>
+              <a:defRPr sz="1600"/>
+            </a:lvl9pPr>
+          </a:lstStyle>
+          <a:p>
+            <a:r>
+              <a:rPr lang="en-US"/>
+              <a:t>Click to edit Master subtitle style</a:t>
+            </a:r>
+          </a:p>
+        </p:txBody>
+      </p:sp>
       <p:pic>
         <p:nvPicPr>
-          <p:cNvPr id="13" name="Picture 12" descr="A blue and white background&#10;&#10;Description automatically generated">
+          <p:cNvPr id="5" name="Graphic 4" descr="Director's Chair with solid fill">
             <a:extLst>
               <a:ext uri="{FF2B5EF4-FFF2-40B4-BE49-F238E27FC236}">
-                <a16:creationId xmlns:a16="http://schemas.microsoft.com/office/drawing/2014/main" id="{31506282-9748-0AF1-9EA1-31A2DF84B36A}"/>
+                <a16:creationId xmlns:a16="http://schemas.microsoft.com/office/drawing/2014/main" id="{60A0A98E-8F03-89C2-B1C5-479704218BB6}"/>
               </a:ext>
             </a:extLst>
           </p:cNvPr>
@@ -155,13 +267,12 @@
         </p:nvPicPr>
         <p:blipFill>
           <a:blip r:embed="rId2">
-            <a:alphaModFix amt="85000"/>
             <a:extLst>
               <a:ext uri="{28A0092B-C50C-407E-A947-70E740481C1C}">
                 <a14:useLocalDpi xmlns:a14="http://schemas.microsoft.com/office/drawing/2010/main" val="0"/>
               </a:ext>
-              <a:ext uri="{837473B0-CC2E-450A-ABE3-18F120FF3D39}">
-                <a1611:picAttrSrcUrl xmlns:a1611="http://schemas.microsoft.com/office/drawing/2016/11/main" r:id="rId3"/>
+              <a:ext uri="{96DAC541-7B7A-43D3-8B79-37D633B846F1}">
+                <asvg:svgBlip xmlns:asvg="http://schemas.microsoft.com/office/drawing/2016/SVG/main" r:embed="rId3"/>
               </a:ext>
             </a:extLst>
           </a:blip>
@@ -171,164 +282,158 @@
         </p:blipFill>
         <p:spPr>
           <a:xfrm>
-            <a:off x="-996778" y="-19736"/>
-            <a:ext cx="13740714" cy="10305536"/>
+            <a:off x="11178309" y="136236"/>
+            <a:ext cx="914400" cy="914400"/>
           </a:xfrm>
           <a:prstGeom prst="rect">
             <a:avLst/>
           </a:prstGeom>
         </p:spPr>
       </p:pic>
-      <p:sp>
-        <p:nvSpPr>
-          <p:cNvPr id="2" name="Title 1">
+      <p:grpSp>
+        <p:nvGrpSpPr>
+          <p:cNvPr id="6" name="Group 5">
             <a:extLst>
               <a:ext uri="{FF2B5EF4-FFF2-40B4-BE49-F238E27FC236}">
-                <a16:creationId xmlns:a16="http://schemas.microsoft.com/office/drawing/2014/main" id="{D656A5CB-4A43-2BF2-9B14-3172479E030C}"/>
+                <a16:creationId xmlns:a16="http://schemas.microsoft.com/office/drawing/2014/main" id="{DB97A502-DE95-8DC0-AD72-438E37B4E61D}"/>
               </a:ext>
             </a:extLst>
           </p:cNvPr>
-          <p:cNvSpPr>
-            <a:spLocks noGrp="1"/>
-          </p:cNvSpPr>
-          <p:nvPr>
-            <p:ph type="ctrTitle"/>
-          </p:nvPr>
-        </p:nvSpPr>
-        <p:spPr>
+          <p:cNvGrpSpPr/>
+          <p:nvPr userDrawn="1"/>
+        </p:nvGrpSpPr>
+        <p:grpSpPr>
           <a:xfrm>
-            <a:off x="1524000" y="1122363"/>
-            <a:ext cx="9144000" cy="2387600"/>
+            <a:off x="1140689" y="2611727"/>
+            <a:ext cx="290946" cy="3565236"/>
+            <a:chOff x="1279236" y="2899353"/>
+            <a:chExt cx="290946" cy="3565236"/>
           </a:xfrm>
-        </p:spPr>
-        <p:txBody>
-          <a:bodyPr anchor="b"/>
-          <a:lstStyle>
-            <a:lvl1pPr algn="ctr">
-              <a:defRPr sz="6000"/>
-            </a:lvl1pPr>
-          </a:lstStyle>
-          <a:p>
-            <a:r>
-              <a:rPr lang="en-US" dirty="0"/>
-              <a:t>Click to edit Master title style</a:t>
-            </a:r>
-          </a:p>
-        </p:txBody>
-      </p:sp>
-      <p:sp>
-        <p:nvSpPr>
-          <p:cNvPr id="3" name="Subtitle 2">
-            <a:extLst>
-              <a:ext uri="{FF2B5EF4-FFF2-40B4-BE49-F238E27FC236}">
-                <a16:creationId xmlns:a16="http://schemas.microsoft.com/office/drawing/2014/main" id="{0558A5BC-1E42-A6CC-5E5E-D6CBCB1062BE}"/>
-              </a:ext>
-            </a:extLst>
-          </p:cNvPr>
-          <p:cNvSpPr>
-            <a:spLocks noGrp="1"/>
-          </p:cNvSpPr>
-          <p:nvPr>
-            <p:ph type="subTitle" idx="1"/>
-          </p:nvPr>
-        </p:nvSpPr>
-        <p:spPr>
-          <a:xfrm>
-            <a:off x="1524000" y="3602038"/>
-            <a:ext cx="9144000" cy="1655762"/>
-          </a:xfrm>
-        </p:spPr>
-        <p:txBody>
-          <a:bodyPr/>
-          <a:lstStyle>
-            <a:lvl1pPr marL="0" indent="0" algn="ctr">
-              <a:buNone/>
-              <a:defRPr sz="2400"/>
-            </a:lvl1pPr>
-            <a:lvl2pPr marL="457200" indent="0" algn="ctr">
-              <a:buNone/>
-              <a:defRPr sz="2000"/>
-            </a:lvl2pPr>
-            <a:lvl3pPr marL="914400" indent="0" algn="ctr">
-              <a:buNone/>
-              <a:defRPr sz="1800"/>
-            </a:lvl3pPr>
-            <a:lvl4pPr marL="1371600" indent="0" algn="ctr">
-              <a:buNone/>
-              <a:defRPr sz="1600"/>
-            </a:lvl4pPr>
-            <a:lvl5pPr marL="1828800" indent="0" algn="ctr">
-              <a:buNone/>
-              <a:defRPr sz="1600"/>
-            </a:lvl5pPr>
-            <a:lvl6pPr marL="2286000" indent="0" algn="ctr">
-              <a:buNone/>
-              <a:defRPr sz="1600"/>
-            </a:lvl6pPr>
-            <a:lvl7pPr marL="2743200" indent="0" algn="ctr">
-              <a:buNone/>
-              <a:defRPr sz="1600"/>
-            </a:lvl7pPr>
-            <a:lvl8pPr marL="3200400" indent="0" algn="ctr">
-              <a:buNone/>
-              <a:defRPr sz="1600"/>
-            </a:lvl8pPr>
-            <a:lvl9pPr marL="3657600" indent="0" algn="ctr">
-              <a:buNone/>
-              <a:defRPr sz="1600"/>
-            </a:lvl9pPr>
-          </a:lstStyle>
-          <a:p>
-            <a:r>
-              <a:rPr lang="en-US"/>
-              <a:t>Click to edit Master subtitle style</a:t>
-            </a:r>
-          </a:p>
-        </p:txBody>
-      </p:sp>
-      <p:sp>
-        <p:nvSpPr>
-          <p:cNvPr id="4" name="Date Placeholder 3">
-            <a:extLst>
-              <a:ext uri="{FF2B5EF4-FFF2-40B4-BE49-F238E27FC236}">
-                <a16:creationId xmlns:a16="http://schemas.microsoft.com/office/drawing/2014/main" id="{0EAC885C-1DFA-597E-0698-509E28E0F85C}"/>
-              </a:ext>
-            </a:extLst>
-          </p:cNvPr>
-          <p:cNvSpPr>
-            <a:spLocks noGrp="1"/>
-          </p:cNvSpPr>
-          <p:nvPr>
-            <p:ph type="dt" sz="half" idx="10"/>
-          </p:nvPr>
-        </p:nvSpPr>
-        <p:spPr>
-          <a:xfrm>
-            <a:off x="0" y="6562295"/>
-            <a:ext cx="2743200" cy="365125"/>
-          </a:xfrm>
-        </p:spPr>
-        <p:txBody>
-          <a:bodyPr/>
-          <a:lstStyle>
-            <a:lvl1pPr>
-              <a:defRPr>
-                <a:solidFill>
-                  <a:schemeClr val="tx1"/>
-                </a:solidFill>
-              </a:defRPr>
-            </a:lvl1pPr>
-          </a:lstStyle>
-          <a:p>
-            <a:fld id="{EAAB551D-C240-4173-9070-E4669C11B4CC}" type="datetimeFigureOut">
-              <a:rPr lang="en-US" smtClean="0"/>
-              <a:pPr/>
-              <a:t>4/25/2024</a:t>
-            </a:fld>
-            <a:endParaRPr lang="en-US" dirty="0"/>
-          </a:p>
-        </p:txBody>
-      </p:sp>
+        </p:grpSpPr>
+        <p:cxnSp>
+          <p:nvCxnSpPr>
+            <p:cNvPr id="7" name="Straight Connector 6">
+              <a:extLst>
+                <a:ext uri="{FF2B5EF4-FFF2-40B4-BE49-F238E27FC236}">
+                  <a16:creationId xmlns:a16="http://schemas.microsoft.com/office/drawing/2014/main" id="{30D9C01C-42D8-493C-27C0-51FA6E3D6F7E}"/>
+                </a:ext>
+              </a:extLst>
+            </p:cNvPr>
+            <p:cNvCxnSpPr/>
+            <p:nvPr userDrawn="1"/>
+          </p:nvCxnSpPr>
+          <p:spPr>
+            <a:xfrm>
+              <a:off x="1431636" y="2899353"/>
+              <a:ext cx="0" cy="3565236"/>
+            </a:xfrm>
+            <a:prstGeom prst="line">
+              <a:avLst/>
+            </a:prstGeom>
+            <a:ln w="76200">
+              <a:solidFill>
+                <a:srgbClr val="3540A5"/>
+              </a:solidFill>
+            </a:ln>
+          </p:spPr>
+          <p:style>
+            <a:lnRef idx="1">
+              <a:schemeClr val="accent1"/>
+            </a:lnRef>
+            <a:fillRef idx="0">
+              <a:schemeClr val="accent1"/>
+            </a:fillRef>
+            <a:effectRef idx="0">
+              <a:schemeClr val="accent1"/>
+            </a:effectRef>
+            <a:fontRef idx="minor">
+              <a:schemeClr val="tx1"/>
+            </a:fontRef>
+          </p:style>
+        </p:cxnSp>
+        <p:cxnSp>
+          <p:nvCxnSpPr>
+            <p:cNvPr id="8" name="Straight Connector 7">
+              <a:extLst>
+                <a:ext uri="{FF2B5EF4-FFF2-40B4-BE49-F238E27FC236}">
+                  <a16:creationId xmlns:a16="http://schemas.microsoft.com/office/drawing/2014/main" id="{C82023AC-B286-1983-D48B-811C956EA105}"/>
+                </a:ext>
+              </a:extLst>
+            </p:cNvPr>
+            <p:cNvCxnSpPr/>
+            <p:nvPr userDrawn="1"/>
+          </p:nvCxnSpPr>
+          <p:spPr>
+            <a:xfrm>
+              <a:off x="1279236" y="3812829"/>
+              <a:ext cx="0" cy="2651760"/>
+            </a:xfrm>
+            <a:prstGeom prst="line">
+              <a:avLst/>
+            </a:prstGeom>
+            <a:ln w="76200">
+              <a:solidFill>
+                <a:srgbClr val="3540A5"/>
+              </a:solidFill>
+            </a:ln>
+          </p:spPr>
+          <p:style>
+            <a:lnRef idx="1">
+              <a:schemeClr val="accent1"/>
+            </a:lnRef>
+            <a:fillRef idx="0">
+              <a:schemeClr val="accent1"/>
+            </a:fillRef>
+            <a:effectRef idx="0">
+              <a:schemeClr val="accent1"/>
+            </a:effectRef>
+            <a:fontRef idx="minor">
+              <a:schemeClr val="tx1"/>
+            </a:fontRef>
+          </p:style>
+        </p:cxnSp>
+        <p:cxnSp>
+          <p:nvCxnSpPr>
+            <p:cNvPr id="9" name="Straight Connector 8">
+              <a:extLst>
+                <a:ext uri="{FF2B5EF4-FFF2-40B4-BE49-F238E27FC236}">
+                  <a16:creationId xmlns:a16="http://schemas.microsoft.com/office/drawing/2014/main" id="{70D142F1-CA0B-1F81-1BD7-0343E28B90B2}"/>
+                </a:ext>
+              </a:extLst>
+            </p:cNvPr>
+            <p:cNvCxnSpPr/>
+            <p:nvPr userDrawn="1"/>
+          </p:nvCxnSpPr>
+          <p:spPr>
+            <a:xfrm>
+              <a:off x="1570182" y="4727229"/>
+              <a:ext cx="0" cy="1737360"/>
+            </a:xfrm>
+            <a:prstGeom prst="line">
+              <a:avLst/>
+            </a:prstGeom>
+            <a:ln w="76200">
+              <a:solidFill>
+                <a:srgbClr val="3540A5"/>
+              </a:solidFill>
+            </a:ln>
+          </p:spPr>
+          <p:style>
+            <a:lnRef idx="1">
+              <a:schemeClr val="accent1"/>
+            </a:lnRef>
+            <a:fillRef idx="0">
+              <a:schemeClr val="accent1"/>
+            </a:fillRef>
+            <a:effectRef idx="0">
+              <a:schemeClr val="accent1"/>
+            </a:effectRef>
+            <a:fontRef idx="minor">
+              <a:schemeClr val="tx1"/>
+            </a:fontRef>
+          </p:style>
+        </p:cxnSp>
+      </p:grpSp>
     </p:spTree>
     <p:extLst>
       <p:ext uri="{BB962C8B-B14F-4D97-AF65-F5344CB8AC3E}">
@@ -705,12 +810,115 @@
           <a:chExt cx="0" cy="0"/>
         </a:xfrm>
       </p:grpSpPr>
+      <p:sp>
+        <p:nvSpPr>
+          <p:cNvPr id="2" name="Title 1">
+            <a:extLst>
+              <a:ext uri="{FF2B5EF4-FFF2-40B4-BE49-F238E27FC236}">
+                <a16:creationId xmlns:a16="http://schemas.microsoft.com/office/drawing/2014/main" id="{DA7332E7-6922-874D-DC2B-A2F8A11AEBE8}"/>
+              </a:ext>
+            </a:extLst>
+          </p:cNvPr>
+          <p:cNvSpPr>
+            <a:spLocks noGrp="1"/>
+          </p:cNvSpPr>
+          <p:nvPr>
+            <p:ph type="title"/>
+          </p:nvPr>
+        </p:nvSpPr>
+        <p:spPr/>
+        <p:txBody>
+          <a:bodyPr/>
+          <a:lstStyle/>
+          <a:p>
+            <a:r>
+              <a:rPr lang="en-US"/>
+              <a:t>Click to edit Master title style</a:t>
+            </a:r>
+          </a:p>
+        </p:txBody>
+      </p:sp>
+      <p:sp>
+        <p:nvSpPr>
+          <p:cNvPr id="3" name="Content Placeholder 2">
+            <a:extLst>
+              <a:ext uri="{FF2B5EF4-FFF2-40B4-BE49-F238E27FC236}">
+                <a16:creationId xmlns:a16="http://schemas.microsoft.com/office/drawing/2014/main" id="{6DDEDE47-A0B3-B021-6D78-709CA34A1D24}"/>
+              </a:ext>
+            </a:extLst>
+          </p:cNvPr>
+          <p:cNvSpPr>
+            <a:spLocks noGrp="1"/>
+          </p:cNvSpPr>
+          <p:nvPr>
+            <p:ph idx="1"/>
+          </p:nvPr>
+        </p:nvSpPr>
+        <p:spPr/>
+        <p:txBody>
+          <a:bodyPr>
+            <a:normAutofit/>
+          </a:bodyPr>
+          <a:lstStyle>
+            <a:lvl1pPr>
+              <a:defRPr sz="1800"/>
+            </a:lvl1pPr>
+            <a:lvl2pPr>
+              <a:defRPr sz="1800"/>
+            </a:lvl2pPr>
+            <a:lvl3pPr>
+              <a:defRPr sz="1800"/>
+            </a:lvl3pPr>
+            <a:lvl4pPr>
+              <a:defRPr sz="1800"/>
+            </a:lvl4pPr>
+            <a:lvl5pPr>
+              <a:defRPr sz="1800"/>
+            </a:lvl5pPr>
+          </a:lstStyle>
+          <a:p>
+            <a:pPr lvl="0"/>
+            <a:r>
+              <a:rPr lang="en-US" dirty="0"/>
+              <a:t>Click to edit Master text styles</a:t>
+            </a:r>
+          </a:p>
+          <a:p>
+            <a:pPr lvl="1"/>
+            <a:r>
+              <a:rPr lang="en-US" dirty="0"/>
+              <a:t>Second level</a:t>
+            </a:r>
+          </a:p>
+          <a:p>
+            <a:pPr lvl="2"/>
+            <a:r>
+              <a:rPr lang="en-US" dirty="0"/>
+              <a:t>Third level</a:t>
+            </a:r>
+          </a:p>
+          <a:p>
+            <a:pPr lvl="3"/>
+            <a:r>
+              <a:rPr lang="en-US" dirty="0"/>
+              <a:t>Fourth level</a:t>
+            </a:r>
+          </a:p>
+          <a:p>
+            <a:pPr lvl="4"/>
+            <a:r>
+              <a:rPr lang="en-US" dirty="0"/>
+              <a:t>Fifth level</a:t>
+            </a:r>
+          </a:p>
+        </p:txBody>
+      </p:sp>
       <p:pic>
         <p:nvPicPr>
-          <p:cNvPr id="7" name="Picture 6" descr="A blue and white background&#10;&#10;Description automatically generated">
+          <p:cNvPr id="15" name="Graphic 14" descr="Film strip outline">
             <a:extLst>
               <a:ext uri="{FF2B5EF4-FFF2-40B4-BE49-F238E27FC236}">
-                <a16:creationId xmlns:a16="http://schemas.microsoft.com/office/drawing/2014/main" id="{9CB93DEA-4C3E-01CA-7C70-AD7B9191BE99}"/>
+                <a16:creationId xmlns:a16="http://schemas.microsoft.com/office/drawing/2014/main" id="{86E96141-4F69-10A8-42B0-B8CAA7AB94F7}"/>
               </a:ext>
             </a:extLst>
           </p:cNvPr>
@@ -721,13 +929,12 @@
         </p:nvPicPr>
         <p:blipFill>
           <a:blip r:embed="rId2">
-            <a:alphaModFix amt="85000"/>
             <a:extLst>
               <a:ext uri="{28A0092B-C50C-407E-A947-70E740481C1C}">
                 <a14:useLocalDpi xmlns:a14="http://schemas.microsoft.com/office/drawing/2010/main" val="0"/>
               </a:ext>
-              <a:ext uri="{837473B0-CC2E-450A-ABE3-18F120FF3D39}">
-                <a1611:picAttrSrcUrl xmlns:a1611="http://schemas.microsoft.com/office/drawing/2016/11/main" r:id="rId3"/>
+              <a:ext uri="{96DAC541-7B7A-43D3-8B79-37D633B846F1}">
+                <asvg:svgBlip xmlns:asvg="http://schemas.microsoft.com/office/drawing/2016/SVG/main" r:embed="rId3"/>
               </a:ext>
             </a:extLst>
           </a:blip>
@@ -736,100 +943,15 @@
           </a:stretch>
         </p:blipFill>
         <p:spPr>
-          <a:xfrm>
-            <a:off x="-576649" y="13215"/>
-            <a:ext cx="13740714" cy="10305536"/>
+          <a:xfrm rot="18736797">
+            <a:off x="11417636" y="132436"/>
+            <a:ext cx="641928" cy="641928"/>
           </a:xfrm>
           <a:prstGeom prst="rect">
             <a:avLst/>
           </a:prstGeom>
         </p:spPr>
       </p:pic>
-      <p:sp>
-        <p:nvSpPr>
-          <p:cNvPr id="2" name="Title 1">
-            <a:extLst>
-              <a:ext uri="{FF2B5EF4-FFF2-40B4-BE49-F238E27FC236}">
-                <a16:creationId xmlns:a16="http://schemas.microsoft.com/office/drawing/2014/main" id="{DA7332E7-6922-874D-DC2B-A2F8A11AEBE8}"/>
-              </a:ext>
-            </a:extLst>
-          </p:cNvPr>
-          <p:cNvSpPr>
-            <a:spLocks noGrp="1"/>
-          </p:cNvSpPr>
-          <p:nvPr>
-            <p:ph type="title"/>
-          </p:nvPr>
-        </p:nvSpPr>
-        <p:spPr/>
-        <p:txBody>
-          <a:bodyPr/>
-          <a:lstStyle/>
-          <a:p>
-            <a:r>
-              <a:rPr lang="en-US"/>
-              <a:t>Click to edit Master title style</a:t>
-            </a:r>
-          </a:p>
-        </p:txBody>
-      </p:sp>
-      <p:sp>
-        <p:nvSpPr>
-          <p:cNvPr id="3" name="Content Placeholder 2">
-            <a:extLst>
-              <a:ext uri="{FF2B5EF4-FFF2-40B4-BE49-F238E27FC236}">
-                <a16:creationId xmlns:a16="http://schemas.microsoft.com/office/drawing/2014/main" id="{6DDEDE47-A0B3-B021-6D78-709CA34A1D24}"/>
-              </a:ext>
-            </a:extLst>
-          </p:cNvPr>
-          <p:cNvSpPr>
-            <a:spLocks noGrp="1"/>
-          </p:cNvSpPr>
-          <p:nvPr>
-            <p:ph idx="1"/>
-          </p:nvPr>
-        </p:nvSpPr>
-        <p:spPr/>
-        <p:txBody>
-          <a:bodyPr/>
-          <a:lstStyle/>
-          <a:p>
-            <a:pPr lvl="0"/>
-            <a:r>
-              <a:rPr lang="en-US"/>
-              <a:t>Click to edit Master text styles</a:t>
-            </a:r>
-          </a:p>
-          <a:p>
-            <a:pPr lvl="1"/>
-            <a:r>
-              <a:rPr lang="en-US"/>
-              <a:t>Second level</a:t>
-            </a:r>
-          </a:p>
-          <a:p>
-            <a:pPr lvl="2"/>
-            <a:r>
-              <a:rPr lang="en-US"/>
-              <a:t>Third level</a:t>
-            </a:r>
-          </a:p>
-          <a:p>
-            <a:pPr lvl="3"/>
-            <a:r>
-              <a:rPr lang="en-US"/>
-              <a:t>Fourth level</a:t>
-            </a:r>
-          </a:p>
-          <a:p>
-            <a:pPr lvl="4"/>
-            <a:r>
-              <a:rPr lang="en-US"/>
-              <a:t>Fifth level</a:t>
-            </a:r>
-          </a:p>
-        </p:txBody>
-      </p:sp>
     </p:spTree>
     <p:extLst>
       <p:ext uri="{BB962C8B-B14F-4D97-AF65-F5344CB8AC3E}">
@@ -844,7 +966,222 @@
 </file>
 
 <file path=ppt/slideLayouts/slideLayout3.xml><?xml version="1.0" encoding="utf-8"?>
-<p:sldLayout xmlns:a="http://schemas.openxmlformats.org/drawingml/2006/main" xmlns:r="http://schemas.openxmlformats.org/officeDocument/2006/relationships" xmlns:p="http://schemas.openxmlformats.org/presentationml/2006/main" type="secHead" preserve="1">
+<p:sldLayout xmlns:a="http://schemas.openxmlformats.org/drawingml/2006/main" xmlns:r="http://schemas.openxmlformats.org/officeDocument/2006/relationships" xmlns:p="http://schemas.openxmlformats.org/presentationml/2006/main" type="twoObj" preserve="1">
+  <p:cSld name="Two Content">
+    <p:spTree>
+      <p:nvGrpSpPr>
+        <p:cNvPr id="1" name=""/>
+        <p:cNvGrpSpPr/>
+        <p:nvPr/>
+      </p:nvGrpSpPr>
+      <p:grpSpPr>
+        <a:xfrm>
+          <a:off x="0" y="0"/>
+          <a:ext cx="0" cy="0"/>
+          <a:chOff x="0" y="0"/>
+          <a:chExt cx="0" cy="0"/>
+        </a:xfrm>
+      </p:grpSpPr>
+      <p:sp>
+        <p:nvSpPr>
+          <p:cNvPr id="2" name="Title 1">
+            <a:extLst>
+              <a:ext uri="{FF2B5EF4-FFF2-40B4-BE49-F238E27FC236}">
+                <a16:creationId xmlns:a16="http://schemas.microsoft.com/office/drawing/2014/main" id="{C8B90B6E-0D1D-9F13-32E7-CE1976E95B0C}"/>
+              </a:ext>
+            </a:extLst>
+          </p:cNvPr>
+          <p:cNvSpPr>
+            <a:spLocks noGrp="1"/>
+          </p:cNvSpPr>
+          <p:nvPr>
+            <p:ph type="title"/>
+          </p:nvPr>
+        </p:nvSpPr>
+        <p:spPr>
+          <a:xfrm>
+            <a:off x="838200" y="365126"/>
+            <a:ext cx="10515600" cy="994118"/>
+          </a:xfrm>
+        </p:spPr>
+        <p:txBody>
+          <a:bodyPr/>
+          <a:lstStyle/>
+          <a:p>
+            <a:r>
+              <a:rPr lang="en-US"/>
+              <a:t>Click to edit Master title style</a:t>
+            </a:r>
+          </a:p>
+        </p:txBody>
+      </p:sp>
+      <p:sp>
+        <p:nvSpPr>
+          <p:cNvPr id="3" name="Content Placeholder 2">
+            <a:extLst>
+              <a:ext uri="{FF2B5EF4-FFF2-40B4-BE49-F238E27FC236}">
+                <a16:creationId xmlns:a16="http://schemas.microsoft.com/office/drawing/2014/main" id="{C258A4DC-8291-501C-E14B-1C95A19BD9AD}"/>
+              </a:ext>
+            </a:extLst>
+          </p:cNvPr>
+          <p:cNvSpPr>
+            <a:spLocks noGrp="1"/>
+          </p:cNvSpPr>
+          <p:nvPr>
+            <p:ph sz="half" idx="1"/>
+          </p:nvPr>
+        </p:nvSpPr>
+        <p:spPr>
+          <a:xfrm>
+            <a:off x="838200" y="2253178"/>
+            <a:ext cx="5181600" cy="4351338"/>
+          </a:xfrm>
+        </p:spPr>
+        <p:txBody>
+          <a:bodyPr/>
+          <a:lstStyle>
+            <a:lvl1pPr marL="0" indent="0">
+              <a:buNone/>
+              <a:defRPr/>
+            </a:lvl1pPr>
+          </a:lstStyle>
+          <a:p>
+            <a:pPr lvl="0"/>
+            <a:endParaRPr lang="en-US" dirty="0"/>
+          </a:p>
+        </p:txBody>
+      </p:sp>
+      <p:sp>
+        <p:nvSpPr>
+          <p:cNvPr id="4" name="Content Placeholder 3">
+            <a:extLst>
+              <a:ext uri="{FF2B5EF4-FFF2-40B4-BE49-F238E27FC236}">
+                <a16:creationId xmlns:a16="http://schemas.microsoft.com/office/drawing/2014/main" id="{BA9241E5-2D00-09FD-00D3-23A9E95D3A06}"/>
+              </a:ext>
+            </a:extLst>
+          </p:cNvPr>
+          <p:cNvSpPr>
+            <a:spLocks noGrp="1"/>
+          </p:cNvSpPr>
+          <p:nvPr>
+            <p:ph sz="half" idx="2"/>
+          </p:nvPr>
+        </p:nvSpPr>
+        <p:spPr>
+          <a:xfrm>
+            <a:off x="6172200" y="2253178"/>
+            <a:ext cx="5181600" cy="4351338"/>
+          </a:xfrm>
+        </p:spPr>
+        <p:txBody>
+          <a:bodyPr/>
+          <a:lstStyle>
+            <a:lvl5pPr marL="1828800" indent="0" algn="l">
+              <a:buNone/>
+              <a:defRPr/>
+            </a:lvl5pPr>
+          </a:lstStyle>
+          <a:p>
+            <a:pPr lvl="4"/>
+            <a:endParaRPr lang="en-US" dirty="0"/>
+          </a:p>
+        </p:txBody>
+      </p:sp>
+      <p:sp>
+        <p:nvSpPr>
+          <p:cNvPr id="5" name="Date Placeholder 4">
+            <a:extLst>
+              <a:ext uri="{FF2B5EF4-FFF2-40B4-BE49-F238E27FC236}">
+                <a16:creationId xmlns:a16="http://schemas.microsoft.com/office/drawing/2014/main" id="{9A784502-82BF-ADD3-3377-03D3B79E8D3A}"/>
+              </a:ext>
+            </a:extLst>
+          </p:cNvPr>
+          <p:cNvSpPr>
+            <a:spLocks noGrp="1"/>
+          </p:cNvSpPr>
+          <p:nvPr>
+            <p:ph type="dt" sz="half" idx="10"/>
+          </p:nvPr>
+        </p:nvSpPr>
+        <p:spPr>
+          <a:xfrm>
+            <a:off x="838200" y="1623648"/>
+            <a:ext cx="10515600" cy="365125"/>
+          </a:xfrm>
+          <a:prstGeom prst="rect">
+            <a:avLst/>
+          </a:prstGeom>
+        </p:spPr>
+        <p:txBody>
+          <a:bodyPr/>
+          <a:lstStyle>
+            <a:lvl1pPr>
+              <a:defRPr>
+                <a:solidFill>
+                  <a:schemeClr val="tx1"/>
+                </a:solidFill>
+              </a:defRPr>
+            </a:lvl1pPr>
+          </a:lstStyle>
+          <a:p>
+            <a:endParaRPr lang="en-US" dirty="0"/>
+          </a:p>
+        </p:txBody>
+      </p:sp>
+      <p:pic>
+        <p:nvPicPr>
+          <p:cNvPr id="7" name="Graphic 6" descr="Film strip outline">
+            <a:extLst>
+              <a:ext uri="{FF2B5EF4-FFF2-40B4-BE49-F238E27FC236}">
+                <a16:creationId xmlns:a16="http://schemas.microsoft.com/office/drawing/2014/main" id="{FE5A3A11-D83A-E408-B699-44FEB2B0CBB5}"/>
+              </a:ext>
+            </a:extLst>
+          </p:cNvPr>
+          <p:cNvPicPr>
+            <a:picLocks noChangeAspect="1"/>
+          </p:cNvPicPr>
+          <p:nvPr userDrawn="1"/>
+        </p:nvPicPr>
+        <p:blipFill>
+          <a:blip r:embed="rId2">
+            <a:extLst>
+              <a:ext uri="{28A0092B-C50C-407E-A947-70E740481C1C}">
+                <a14:useLocalDpi xmlns:a14="http://schemas.microsoft.com/office/drawing/2010/main" val="0"/>
+              </a:ext>
+              <a:ext uri="{96DAC541-7B7A-43D3-8B79-37D633B846F1}">
+                <asvg:svgBlip xmlns:asvg="http://schemas.microsoft.com/office/drawing/2016/SVG/main" r:embed="rId3"/>
+              </a:ext>
+            </a:extLst>
+          </a:blip>
+          <a:stretch>
+            <a:fillRect/>
+          </a:stretch>
+        </p:blipFill>
+        <p:spPr>
+          <a:xfrm rot="18736797">
+            <a:off x="11417636" y="132436"/>
+            <a:ext cx="641928" cy="641928"/>
+          </a:xfrm>
+          <a:prstGeom prst="rect">
+            <a:avLst/>
+          </a:prstGeom>
+        </p:spPr>
+      </p:pic>
+    </p:spTree>
+    <p:extLst>
+      <p:ext uri="{BB962C8B-B14F-4D97-AF65-F5344CB8AC3E}">
+        <p14:creationId xmlns:p14="http://schemas.microsoft.com/office/powerpoint/2010/main" val="947676095"/>
+      </p:ext>
+    </p:extLst>
+  </p:cSld>
+  <p:clrMapOvr>
+    <a:masterClrMapping/>
+  </p:clrMapOvr>
+</p:sldLayout>
+</file>
+
+<file path=ppt/slideLayouts/slideLayout4.xml><?xml version="1.0" encoding="utf-8"?>
+<p:sldLayout xmlns:a="http://schemas.openxmlformats.org/drawingml/2006/main" xmlns:r="http://schemas.openxmlformats.org/officeDocument/2006/relationships" xmlns:p="http://schemas.openxmlformats.org/presentationml/2006/main" type="titleOnly" preserve="1">
   <p:cSld name="Section Header">
     <p:spTree>
       <p:nvGrpSpPr>
@@ -862,7 +1199,13 @@
       </p:grpSpPr>
       <p:sp>
         <p:nvSpPr>
-          <p:cNvPr id="2" name="Title 1"/>
+          <p:cNvPr id="2" name="Title 1">
+            <a:extLst>
+              <a:ext uri="{FF2B5EF4-FFF2-40B4-BE49-F238E27FC236}">
+                <a16:creationId xmlns:a16="http://schemas.microsoft.com/office/drawing/2014/main" id="{451B1580-D16B-B50C-E10B-3A06745DF9C9}"/>
+              </a:ext>
+            </a:extLst>
+          </p:cNvPr>
           <p:cNvSpPr>
             <a:spLocks noGrp="1"/>
           </p:cNvSpPr>
@@ -872,245 +1215,27 @@
         </p:nvSpPr>
         <p:spPr>
           <a:xfrm>
-            <a:off x="722313" y="3305176"/>
-            <a:ext cx="7772400" cy="1021556"/>
+            <a:off x="1681018" y="2558473"/>
+            <a:ext cx="6973455" cy="3694545"/>
           </a:xfrm>
         </p:spPr>
         <p:txBody>
-          <a:bodyPr anchor="t"/>
-          <a:lstStyle>
-            <a:lvl1pPr algn="l">
-              <a:defRPr sz="3000" b="1" cap="all"/>
-            </a:lvl1pPr>
-          </a:lstStyle>
-          <a:p>
-            <a:r>
-              <a:rPr lang="en-US"/>
-              <a:t>Click to edit Master title style</a:t>
-            </a:r>
-          </a:p>
-        </p:txBody>
-      </p:sp>
-      <p:sp>
-        <p:nvSpPr>
-          <p:cNvPr id="3" name="Text Placeholder 2"/>
-          <p:cNvSpPr>
-            <a:spLocks noGrp="1"/>
-          </p:cNvSpPr>
-          <p:nvPr>
-            <p:ph type="body" idx="1"/>
-          </p:nvPr>
-        </p:nvSpPr>
-        <p:spPr>
-          <a:xfrm>
-            <a:off x="722313" y="2180035"/>
-            <a:ext cx="7772400" cy="1125140"/>
-          </a:xfrm>
-        </p:spPr>
-        <p:txBody>
-          <a:bodyPr anchor="b"/>
-          <a:lstStyle>
-            <a:lvl1pPr marL="0" indent="0">
-              <a:buNone/>
-              <a:defRPr sz="1500">
-                <a:solidFill>
-                  <a:schemeClr val="tx1">
-                    <a:tint val="75000"/>
-                  </a:schemeClr>
-                </a:solidFill>
-              </a:defRPr>
-            </a:lvl1pPr>
-            <a:lvl2pPr marL="342900" indent="0">
-              <a:buNone/>
-              <a:defRPr sz="1350">
-                <a:solidFill>
-                  <a:schemeClr val="tx1">
-                    <a:tint val="75000"/>
-                  </a:schemeClr>
-                </a:solidFill>
-              </a:defRPr>
-            </a:lvl2pPr>
-            <a:lvl3pPr marL="685800" indent="0">
-              <a:buNone/>
-              <a:defRPr sz="1200">
-                <a:solidFill>
-                  <a:schemeClr val="tx1">
-                    <a:tint val="75000"/>
-                  </a:schemeClr>
-                </a:solidFill>
-              </a:defRPr>
-            </a:lvl3pPr>
-            <a:lvl4pPr marL="1028700" indent="0">
-              <a:buNone/>
-              <a:defRPr sz="1050">
-                <a:solidFill>
-                  <a:schemeClr val="tx1">
-                    <a:tint val="75000"/>
-                  </a:schemeClr>
-                </a:solidFill>
-              </a:defRPr>
-            </a:lvl4pPr>
-            <a:lvl5pPr marL="1371600" indent="0">
-              <a:buNone/>
-              <a:defRPr sz="1050">
-                <a:solidFill>
-                  <a:schemeClr val="tx1">
-                    <a:tint val="75000"/>
-                  </a:schemeClr>
-                </a:solidFill>
-              </a:defRPr>
-            </a:lvl5pPr>
-            <a:lvl6pPr marL="1714500" indent="0">
-              <a:buNone/>
-              <a:defRPr sz="1050">
-                <a:solidFill>
-                  <a:schemeClr val="tx1">
-                    <a:tint val="75000"/>
-                  </a:schemeClr>
-                </a:solidFill>
-              </a:defRPr>
-            </a:lvl6pPr>
-            <a:lvl7pPr marL="2057400" indent="0">
-              <a:buNone/>
-              <a:defRPr sz="1050">
-                <a:solidFill>
-                  <a:schemeClr val="tx1">
-                    <a:tint val="75000"/>
-                  </a:schemeClr>
-                </a:solidFill>
-              </a:defRPr>
-            </a:lvl7pPr>
-            <a:lvl8pPr marL="2400300" indent="0">
-              <a:buNone/>
-              <a:defRPr sz="1050">
-                <a:solidFill>
-                  <a:schemeClr val="tx1">
-                    <a:tint val="75000"/>
-                  </a:schemeClr>
-                </a:solidFill>
-              </a:defRPr>
-            </a:lvl8pPr>
-            <a:lvl9pPr marL="2743200" indent="0">
-              <a:buNone/>
-              <a:defRPr sz="1050">
-                <a:solidFill>
-                  <a:schemeClr val="tx1">
-                    <a:tint val="75000"/>
-                  </a:schemeClr>
-                </a:solidFill>
-              </a:defRPr>
-            </a:lvl9pPr>
-          </a:lstStyle>
-          <a:p>
-            <a:pPr lvl="0"/>
-            <a:r>
-              <a:rPr lang="en-US"/>
-              <a:t>Click to edit Master text styles</a:t>
-            </a:r>
-          </a:p>
-        </p:txBody>
-      </p:sp>
-      <p:sp>
-        <p:nvSpPr>
-          <p:cNvPr id="4" name="Date Placeholder 3"/>
-          <p:cNvSpPr>
-            <a:spLocks noGrp="1"/>
-          </p:cNvSpPr>
-          <p:nvPr>
-            <p:ph type="dt" sz="half" idx="10"/>
-          </p:nvPr>
-        </p:nvSpPr>
-        <p:spPr/>
-        <p:txBody>
           <a:bodyPr/>
           <a:lstStyle/>
           <a:p>
-            <a:fld id="{241EB5C9-1307-BA42-ABA2-0BC069CD8E7F}" type="datetimeFigureOut">
-              <a:rPr lang="en-US" smtClean="0"/>
-              <a:t>1/2/22</a:t>
-            </a:fld>
-            <a:endParaRPr lang="en-US"/>
-          </a:p>
-        </p:txBody>
-      </p:sp>
-      <p:sp>
-        <p:nvSpPr>
-          <p:cNvPr id="5" name="Footer Placeholder 4"/>
-          <p:cNvSpPr>
-            <a:spLocks noGrp="1"/>
-          </p:cNvSpPr>
-          <p:nvPr>
-            <p:ph type="ftr" sz="quarter" idx="11"/>
-          </p:nvPr>
-        </p:nvSpPr>
-        <p:spPr/>
-        <p:txBody>
-          <a:bodyPr/>
-          <a:lstStyle/>
-          <a:p>
-            <a:endParaRPr lang="en-US"/>
-          </a:p>
-        </p:txBody>
-      </p:sp>
-      <p:sp>
-        <p:nvSpPr>
-          <p:cNvPr id="6" name="Slide Number Placeholder 5"/>
-          <p:cNvSpPr>
-            <a:spLocks noGrp="1"/>
-          </p:cNvSpPr>
-          <p:nvPr>
-            <p:ph type="sldNum" sz="quarter" idx="12"/>
-          </p:nvPr>
-        </p:nvSpPr>
-        <p:spPr/>
-        <p:txBody>
-          <a:bodyPr/>
-          <a:lstStyle/>
-          <a:p>
-            <a:fld id="{C5EF2332-01BF-834F-8236-50238282D533}" type="slidenum">
-              <a:rPr lang="en-US" smtClean="0"/>
-              <a:t>‹#›</a:t>
-            </a:fld>
-            <a:endParaRPr lang="en-US"/>
-          </a:p>
-        </p:txBody>
-      </p:sp>
-    </p:spTree>
-    <p:extLst>
-      <p:ext uri="{BB962C8B-B14F-4D97-AF65-F5344CB8AC3E}">
-        <p14:creationId xmlns:p14="http://schemas.microsoft.com/office/powerpoint/2010/main" val="1073069076"/>
-      </p:ext>
-    </p:extLst>
-  </p:cSld>
-  <p:clrMapOvr>
-    <a:masterClrMapping/>
-  </p:clrMapOvr>
-</p:sldLayout>
-</file>
-
-<file path=ppt/slideLayouts/slideLayout4.xml><?xml version="1.0" encoding="utf-8"?>
-<p:sldLayout xmlns:a="http://schemas.openxmlformats.org/drawingml/2006/main" xmlns:r="http://schemas.openxmlformats.org/officeDocument/2006/relationships" xmlns:p="http://schemas.openxmlformats.org/presentationml/2006/main" type="objTx" preserve="1">
-  <p:cSld name="Content with Caption">
-    <p:spTree>
-      <p:nvGrpSpPr>
-        <p:cNvPr id="1" name=""/>
-        <p:cNvGrpSpPr/>
-        <p:nvPr/>
-      </p:nvGrpSpPr>
-      <p:grpSpPr>
-        <a:xfrm>
-          <a:off x="0" y="0"/>
-          <a:ext cx="0" cy="0"/>
-          <a:chOff x="0" y="0"/>
-          <a:chExt cx="0" cy="0"/>
-        </a:xfrm>
-      </p:grpSpPr>
+            <a:r>
+              <a:rPr lang="en-US" dirty="0"/>
+              <a:t>Click to edit Master title style</a:t>
+            </a:r>
+          </a:p>
+        </p:txBody>
+      </p:sp>
       <p:pic>
         <p:nvPicPr>
-          <p:cNvPr id="8" name="Picture 7" descr="A blue and white background&#10;&#10;Description automatically generated">
+          <p:cNvPr id="4" name="Graphic 3" descr="Director's Chair with solid fill">
             <a:extLst>
               <a:ext uri="{FF2B5EF4-FFF2-40B4-BE49-F238E27FC236}">
-                <a16:creationId xmlns:a16="http://schemas.microsoft.com/office/drawing/2014/main" id="{3DDED455-92DA-5D5F-D348-C216F80A4D71}"/>
+                <a16:creationId xmlns:a16="http://schemas.microsoft.com/office/drawing/2014/main" id="{4B411D7A-6620-911A-E9BF-7FE59196D545}"/>
               </a:ext>
             </a:extLst>
           </p:cNvPr>
@@ -1121,13 +1246,12 @@
         </p:nvPicPr>
         <p:blipFill>
           <a:blip r:embed="rId2">
-            <a:alphaModFix amt="85000"/>
             <a:extLst>
               <a:ext uri="{28A0092B-C50C-407E-A947-70E740481C1C}">
                 <a14:useLocalDpi xmlns:a14="http://schemas.microsoft.com/office/drawing/2010/main" val="0"/>
               </a:ext>
-              <a:ext uri="{837473B0-CC2E-450A-ABE3-18F120FF3D39}">
-                <a1611:picAttrSrcUrl xmlns:a1611="http://schemas.microsoft.com/office/drawing/2016/11/main" r:id="rId3"/>
+              <a:ext uri="{96DAC541-7B7A-43D3-8B79-37D633B846F1}">
+                <asvg:svgBlip xmlns:asvg="http://schemas.microsoft.com/office/drawing/2016/SVG/main" r:embed="rId3"/>
               </a:ext>
             </a:extLst>
           </a:blip>
@@ -1137,186 +1261,18 @@
         </p:blipFill>
         <p:spPr>
           <a:xfrm>
-            <a:off x="-576649" y="13215"/>
-            <a:ext cx="13740714" cy="10305536"/>
+            <a:off x="11178309" y="136236"/>
+            <a:ext cx="914400" cy="914400"/>
           </a:xfrm>
           <a:prstGeom prst="rect">
             <a:avLst/>
           </a:prstGeom>
         </p:spPr>
       </p:pic>
-      <p:sp>
-        <p:nvSpPr>
-          <p:cNvPr id="2" name="Title 1">
-            <a:extLst>
-              <a:ext uri="{FF2B5EF4-FFF2-40B4-BE49-F238E27FC236}">
-                <a16:creationId xmlns:a16="http://schemas.microsoft.com/office/drawing/2014/main" id="{054181AB-C9D2-E6D9-86AD-D8CC39B3FEFB}"/>
-              </a:ext>
-            </a:extLst>
-          </p:cNvPr>
-          <p:cNvSpPr>
-            <a:spLocks noGrp="1"/>
-          </p:cNvSpPr>
-          <p:nvPr>
-            <p:ph type="title"/>
-          </p:nvPr>
-        </p:nvSpPr>
-        <p:spPr>
-          <a:xfrm>
-            <a:off x="839788" y="457200"/>
-            <a:ext cx="3932237" cy="1600200"/>
-          </a:xfrm>
-        </p:spPr>
-        <p:txBody>
-          <a:bodyPr anchor="b"/>
-          <a:lstStyle>
-            <a:lvl1pPr>
-              <a:defRPr sz="3200"/>
-            </a:lvl1pPr>
-          </a:lstStyle>
-          <a:p>
-            <a:r>
-              <a:rPr lang="en-US" dirty="0"/>
-              <a:t>Click to edit Master title style</a:t>
-            </a:r>
-          </a:p>
-        </p:txBody>
-      </p:sp>
-      <p:sp>
-        <p:nvSpPr>
-          <p:cNvPr id="3" name="Content Placeholder 2">
-            <a:extLst>
-              <a:ext uri="{FF2B5EF4-FFF2-40B4-BE49-F238E27FC236}">
-                <a16:creationId xmlns:a16="http://schemas.microsoft.com/office/drawing/2014/main" id="{28C90AF0-2B4E-6B58-8C93-C84BEFC4BC86}"/>
-              </a:ext>
-            </a:extLst>
-          </p:cNvPr>
-          <p:cNvSpPr>
-            <a:spLocks noGrp="1"/>
-          </p:cNvSpPr>
-          <p:nvPr>
-            <p:ph idx="1"/>
-          </p:nvPr>
-        </p:nvSpPr>
-        <p:spPr>
-          <a:xfrm>
-            <a:off x="5183188" y="987425"/>
-            <a:ext cx="6172200" cy="4873625"/>
-          </a:xfrm>
-        </p:spPr>
-        <p:txBody>
-          <a:bodyPr/>
-          <a:lstStyle>
-            <a:lvl1pPr marL="0" indent="0">
-              <a:buNone/>
-              <a:defRPr sz="3200"/>
-            </a:lvl1pPr>
-            <a:lvl2pPr>
-              <a:defRPr sz="2800"/>
-            </a:lvl2pPr>
-            <a:lvl3pPr>
-              <a:defRPr sz="2400"/>
-            </a:lvl3pPr>
-            <a:lvl4pPr>
-              <a:defRPr sz="2000"/>
-            </a:lvl4pPr>
-            <a:lvl5pPr>
-              <a:defRPr sz="2000"/>
-            </a:lvl5pPr>
-            <a:lvl6pPr>
-              <a:defRPr sz="2000"/>
-            </a:lvl6pPr>
-            <a:lvl7pPr>
-              <a:defRPr sz="2000"/>
-            </a:lvl7pPr>
-            <a:lvl8pPr>
-              <a:defRPr sz="2000"/>
-            </a:lvl8pPr>
-            <a:lvl9pPr>
-              <a:defRPr sz="2000"/>
-            </a:lvl9pPr>
-          </a:lstStyle>
-          <a:p>
-            <a:pPr lvl="0"/>
-            <a:endParaRPr lang="en-US" dirty="0"/>
-          </a:p>
-        </p:txBody>
-      </p:sp>
-      <p:sp>
-        <p:nvSpPr>
-          <p:cNvPr id="4" name="Text Placeholder 3">
-            <a:extLst>
-              <a:ext uri="{FF2B5EF4-FFF2-40B4-BE49-F238E27FC236}">
-                <a16:creationId xmlns:a16="http://schemas.microsoft.com/office/drawing/2014/main" id="{45A73796-F46A-DF49-5C20-882964226AE5}"/>
-              </a:ext>
-            </a:extLst>
-          </p:cNvPr>
-          <p:cNvSpPr>
-            <a:spLocks noGrp="1"/>
-          </p:cNvSpPr>
-          <p:nvPr>
-            <p:ph type="body" sz="half" idx="2"/>
-          </p:nvPr>
-        </p:nvSpPr>
-        <p:spPr>
-          <a:xfrm>
-            <a:off x="839789" y="2057400"/>
-            <a:ext cx="3198812" cy="3811588"/>
-          </a:xfrm>
-        </p:spPr>
-        <p:txBody>
-          <a:bodyPr/>
-          <a:lstStyle>
-            <a:lvl1pPr marL="0" indent="0">
-              <a:buNone/>
-              <a:defRPr sz="1600"/>
-            </a:lvl1pPr>
-            <a:lvl2pPr marL="457200" indent="0">
-              <a:buNone/>
-              <a:defRPr sz="1400"/>
-            </a:lvl2pPr>
-            <a:lvl3pPr marL="914400" indent="0">
-              <a:buNone/>
-              <a:defRPr sz="1200"/>
-            </a:lvl3pPr>
-            <a:lvl4pPr marL="1371600" indent="0">
-              <a:buNone/>
-              <a:defRPr sz="1000"/>
-            </a:lvl4pPr>
-            <a:lvl5pPr marL="1828800" indent="0">
-              <a:buNone/>
-              <a:defRPr sz="1000"/>
-            </a:lvl5pPr>
-            <a:lvl6pPr marL="2286000" indent="0">
-              <a:buNone/>
-              <a:defRPr sz="1000"/>
-            </a:lvl6pPr>
-            <a:lvl7pPr marL="2743200" indent="0">
-              <a:buNone/>
-              <a:defRPr sz="1000"/>
-            </a:lvl7pPr>
-            <a:lvl8pPr marL="3200400" indent="0">
-              <a:buNone/>
-              <a:defRPr sz="1000"/>
-            </a:lvl8pPr>
-            <a:lvl9pPr marL="3657600" indent="0">
-              <a:buNone/>
-              <a:defRPr sz="1000"/>
-            </a:lvl9pPr>
-          </a:lstStyle>
-          <a:p>
-            <a:pPr lvl="0"/>
-            <a:r>
-              <a:rPr lang="en-US"/>
-              <a:t>Click to edit Master text styles</a:t>
-            </a:r>
-          </a:p>
-        </p:txBody>
-      </p:sp>
     </p:spTree>
     <p:extLst>
       <p:ext uri="{BB962C8B-B14F-4D97-AF65-F5344CB8AC3E}">
-        <p14:creationId xmlns:p14="http://schemas.microsoft.com/office/powerpoint/2010/main" val="2376296454"/>
+        <p14:creationId xmlns:p14="http://schemas.microsoft.com/office/powerpoint/2010/main" val="1788987719"/>
       </p:ext>
     </p:extLst>
   </p:cSld>
@@ -2488,9 +2444,19 @@
 <p:sldMaster xmlns:a="http://schemas.openxmlformats.org/drawingml/2006/main" xmlns:p="http://schemas.openxmlformats.org/presentationml/2006/main" xmlns:r="http://schemas.openxmlformats.org/officeDocument/2006/relationships">
   <p:cSld>
     <p:bg>
-      <p:bgRef idx="1001">
-        <a:schemeClr val="bg1"/>
-      </p:bgRef>
+      <p:bgPr>
+        <a:pattFill prst="pct10">
+          <a:fgClr>
+            <a:schemeClr val="accent4">
+              <a:lumMod val="75000"/>
+            </a:schemeClr>
+          </a:fgClr>
+          <a:bgClr>
+            <a:schemeClr val="bg1"/>
+          </a:bgClr>
+        </a:pattFill>
+        <a:effectLst/>
+      </p:bgPr>
     </p:bg>
     <p:spTree>
       <p:nvGrpSpPr>
@@ -2506,46 +2472,6 @@
           <a:chExt cx="0" cy="0"/>
         </a:xfrm>
       </p:grpSpPr>
-      <p:pic>
-        <p:nvPicPr>
-          <p:cNvPr descr="A blue and white background  Description automatically generated" id="7" name="Picture 6">
-            <a:extLst>
-              <a:ext uri="{FF2B5EF4-FFF2-40B4-BE49-F238E27FC236}">
-                <a16:creationId xmlns:a16="http://schemas.microsoft.com/office/drawing/2014/main" id="{5F3B6B81-6805-3B38-4F75-DE46A035B4E7}"/>
-              </a:ext>
-            </a:extLst>
-          </p:cNvPr>
-          <p:cNvPicPr>
-            <a:picLocks noChangeAspect="1"/>
-          </p:cNvPicPr>
-          <p:nvPr userDrawn="1"/>
-        </p:nvPicPr>
-        <p:blipFill>
-          <a:blip r:embed="rId7">
-            <a:alphaModFix amt="85000"/>
-            <a:extLst>
-              <a:ext uri="{28A0092B-C50C-407E-A947-70E740481C1C}">
-                <a14:useLocalDpi xmlns:a14="http://schemas.microsoft.com/office/drawing/2010/main" val="0"/>
-              </a:ext>
-              <a:ext uri="{837473B0-CC2E-450A-ABE3-18F120FF3D39}">
-                <a1611:picAttrSrcUrl xmlns:a1611="http://schemas.microsoft.com/office/drawing/2016/11/main" r:id="rId8"/>
-              </a:ext>
-            </a:extLst>
-          </a:blip>
-          <a:stretch>
-            <a:fillRect/>
-          </a:stretch>
-        </p:blipFill>
-        <p:spPr>
-          <a:xfrm>
-            <a:off x="-576649" y="13215"/>
-            <a:ext cx="13740714" cy="10305536"/>
-          </a:xfrm>
-          <a:prstGeom prst="rect">
-            <a:avLst/>
-          </a:prstGeom>
-        </p:spPr>
-      </p:pic>
       <p:sp>
         <p:nvSpPr>
           <p:cNvPr id="2" name="Title Placeholder 1">
@@ -2578,7 +2504,7 @@
           <a:lstStyle/>
           <a:p>
             <a:r>
-              <a:rPr lang="en-US"/>
+              <a:rPr dirty="0" lang="en-US"/>
               <a:t>Click to edit Master title style</a:t>
             </a:r>
           </a:p>
@@ -2617,35 +2543,35 @@
           <a:p>
             <a:pPr lvl="0"/>
             <a:r>
-              <a:rPr lang="en-US"/>
+              <a:rPr dirty="0" lang="en-US"/>
               <a:t>Click to edit Master text styles</a:t>
             </a:r>
           </a:p>
           <a:p>
             <a:pPr lvl="1"/>
             <a:r>
-              <a:rPr lang="en-US"/>
+              <a:rPr dirty="0" lang="en-US"/>
               <a:t>Second level</a:t>
             </a:r>
           </a:p>
           <a:p>
             <a:pPr lvl="2"/>
             <a:r>
-              <a:rPr lang="en-US"/>
+              <a:rPr dirty="0" lang="en-US"/>
               <a:t>Third level</a:t>
             </a:r>
           </a:p>
           <a:p>
             <a:pPr lvl="3"/>
             <a:r>
-              <a:rPr lang="en-US"/>
+              <a:rPr dirty="0" lang="en-US"/>
               <a:t>Fourth level</a:t>
             </a:r>
           </a:p>
           <a:p>
             <a:pPr lvl="4"/>
             <a:r>
-              <a:rPr lang="en-US"/>
+              <a:rPr dirty="0" lang="en-US"/>
               <a:t>Fifth level</a:t>
             </a:r>
           </a:p>
@@ -2653,141 +2579,220 @@
       </p:sp>
       <p:sp>
         <p:nvSpPr>
-          <p:cNvPr id="4" name="Date Placeholder 3">
+          <p:cNvPr id="8" name="TextBox 7">
             <a:extLst>
               <a:ext uri="{FF2B5EF4-FFF2-40B4-BE49-F238E27FC236}">
-                <a16:creationId xmlns:a16="http://schemas.microsoft.com/office/drawing/2014/main" id="{A303320D-CBC1-CC99-B99F-79E090FCA54E}"/>
+                <a16:creationId xmlns:a16="http://schemas.microsoft.com/office/drawing/2014/main" id="{019E6193-8C6F-6316-A214-67A6A4516A33}"/>
               </a:ext>
             </a:extLst>
           </p:cNvPr>
-          <p:cNvSpPr>
-            <a:spLocks noGrp="1"/>
-          </p:cNvSpPr>
-          <p:nvPr>
-            <p:ph idx="2" sz="half" type="dt"/>
-          </p:nvPr>
+          <p:cNvSpPr txBox="1"/>
+          <p:nvPr userDrawn="1"/>
         </p:nvSpPr>
         <p:spPr>
           <a:xfrm>
-            <a:off x="838200" y="6356350"/>
-            <a:ext cx="2743200" cy="365125"/>
+            <a:off x="838200" y="6488539"/>
+            <a:ext cx="2743200" cy="276999"/>
           </a:xfrm>
           <a:prstGeom prst="rect">
             <a:avLst/>
           </a:prstGeom>
+          <a:noFill/>
         </p:spPr>
         <p:txBody>
-          <a:bodyPr anchor="ctr" bIns="45720" lIns="91440" rIns="91440" rtlCol="0" tIns="45720" vert="horz"/>
-          <a:lstStyle>
-            <a:lvl1pPr algn="l">
-              <a:defRPr sz="1200">
-                <a:solidFill>
-                  <a:schemeClr val="tx1">
-                    <a:tint val="75000"/>
-                  </a:schemeClr>
-                </a:solidFill>
-              </a:defRPr>
-            </a:lvl1pPr>
-          </a:lstStyle>
-          <a:p>
-            <a:fld id="{EAAB551D-C240-4173-9070-E4669C11B4CC}" type="datetimeFigureOut">
-              <a:rPr lang="en-US" smtClean="0"/>
-              <a:t>4/25/2024</a:t>
-            </a:fld>
-            <a:endParaRPr lang="en-US"/>
-          </a:p>
-        </p:txBody>
-      </p:sp>
-      <p:sp>
-        <p:nvSpPr>
-          <p:cNvPr id="5" name="Footer Placeholder 4">
+          <a:bodyPr rtlCol="0" wrap="square">
+            <a:spAutoFit/>
+          </a:bodyPr>
+          <a:lstStyle/>
+          <a:p>
+            <a:r>
+              <a:rPr dirty="0" lang="en-US" sz="1200"/>
+              <a:t>Thursday, April 25, 2024</a:t>
+            </a:r>
+          </a:p>
+        </p:txBody>
+      </p:sp>
+      <p:sp>
+        <p:nvSpPr>
+          <p:cNvPr id="9" name="TextBox 8">
             <a:extLst>
               <a:ext uri="{FF2B5EF4-FFF2-40B4-BE49-F238E27FC236}">
-                <a16:creationId xmlns:a16="http://schemas.microsoft.com/office/drawing/2014/main" id="{D903B7BF-9A9E-6D86-8739-4D3AAD8C19AD}"/>
+                <a16:creationId xmlns:a16="http://schemas.microsoft.com/office/drawing/2014/main" id="{E2F28948-B8AC-40D2-682F-E0F43E63F7DB}"/>
               </a:ext>
             </a:extLst>
           </p:cNvPr>
-          <p:cNvSpPr>
-            <a:spLocks noGrp="1"/>
-          </p:cNvSpPr>
-          <p:nvPr>
-            <p:ph idx="3" sz="quarter" type="ftr"/>
-          </p:nvPr>
+          <p:cNvSpPr txBox="1"/>
+          <p:nvPr userDrawn="1"/>
         </p:nvSpPr>
         <p:spPr>
           <a:xfrm>
-            <a:off x="4038600" y="6356350"/>
-            <a:ext cx="4114800" cy="365125"/>
+            <a:off x="8610600" y="6464589"/>
+            <a:ext cx="2743200" cy="276999"/>
           </a:xfrm>
           <a:prstGeom prst="rect">
             <a:avLst/>
           </a:prstGeom>
+          <a:noFill/>
         </p:spPr>
         <p:txBody>
-          <a:bodyPr anchor="ctr" bIns="45720" lIns="91440" rIns="91440" rtlCol="0" tIns="45720" vert="horz"/>
-          <a:lstStyle>
-            <a:lvl1pPr algn="ctr">
-              <a:defRPr sz="1200">
-                <a:solidFill>
-                  <a:schemeClr val="tx1">
-                    <a:tint val="75000"/>
-                  </a:schemeClr>
-                </a:solidFill>
-              </a:defRPr>
-            </a:lvl1pPr>
-          </a:lstStyle>
-          <a:p>
-            <a:endParaRPr lang="en-US"/>
-          </a:p>
-        </p:txBody>
-      </p:sp>
-      <p:sp>
-        <p:nvSpPr>
-          <p:cNvPr id="6" name="Slide Number Placeholder 5">
+          <a:bodyPr rtlCol="0" wrap="square">
+            <a:spAutoFit/>
+          </a:bodyPr>
+          <a:lstStyle/>
+          <a:p>
+            <a:pPr algn="r"/>
+            <a:fld id="{88386037-D50D-4E56-8446-AAC1D718ACF0}" type="slidenum">
+              <a:rPr lang="en-US" smtClean="0" sz="1200"/>
+              <a:t>‹#›</a:t>
+            </a:fld>
+            <a:endParaRPr dirty="0" lang="en-US"/>
+          </a:p>
+        </p:txBody>
+      </p:sp>
+      <p:grpSp>
+        <p:nvGrpSpPr>
+          <p:cNvPr id="5" name="Group 4">
             <a:extLst>
               <a:ext uri="{FF2B5EF4-FFF2-40B4-BE49-F238E27FC236}">
-                <a16:creationId xmlns:a16="http://schemas.microsoft.com/office/drawing/2014/main" id="{D5578A5A-2A7D-3729-8E63-7720E222A61B}"/>
+                <a16:creationId xmlns:a16="http://schemas.microsoft.com/office/drawing/2014/main" id="{D87BA2D8-9332-D722-8E1F-C20F1DE10E6A}"/>
               </a:ext>
             </a:extLst>
           </p:cNvPr>
-          <p:cNvSpPr>
-            <a:spLocks noGrp="1"/>
-          </p:cNvSpPr>
-          <p:nvPr>
-            <p:ph idx="4" sz="quarter" type="sldNum"/>
-          </p:nvPr>
-        </p:nvSpPr>
-        <p:spPr>
-          <a:xfrm>
-            <a:off x="8610600" y="6356350"/>
-            <a:ext cx="2743200" cy="365125"/>
+          <p:cNvGrpSpPr/>
+          <p:nvPr userDrawn="1"/>
+        </p:nvGrpSpPr>
+        <p:grpSpPr>
+          <a:xfrm rot="10800000">
+            <a:off x="10760364" y="365125"/>
+            <a:ext cx="290946" cy="3565236"/>
+            <a:chOff x="1279236" y="2899353"/>
+            <a:chExt cx="290946" cy="3565236"/>
           </a:xfrm>
-          <a:prstGeom prst="rect">
-            <a:avLst/>
-          </a:prstGeom>
-        </p:spPr>
-        <p:txBody>
-          <a:bodyPr anchor="ctr" bIns="45720" lIns="91440" rIns="91440" rtlCol="0" tIns="45720" vert="horz"/>
-          <a:lstStyle>
-            <a:lvl1pPr algn="r">
-              <a:defRPr sz="1200">
-                <a:solidFill>
-                  <a:schemeClr val="tx1">
-                    <a:tint val="75000"/>
-                  </a:schemeClr>
-                </a:solidFill>
-              </a:defRPr>
-            </a:lvl1pPr>
-          </a:lstStyle>
-          <a:p>
-            <a:fld id="{DB9790A6-DF32-4548-A1C0-39AC018C78C6}" type="slidenum">
-              <a:rPr lang="en-US" smtClean="0"/>
-              <a:t>‹#›</a:t>
-            </a:fld>
-            <a:endParaRPr lang="en-US"/>
-          </a:p>
-        </p:txBody>
-      </p:sp>
+        </p:grpSpPr>
+        <p:cxnSp>
+          <p:nvCxnSpPr>
+            <p:cNvPr id="6" name="Straight Connector 5">
+              <a:extLst>
+                <a:ext uri="{FF2B5EF4-FFF2-40B4-BE49-F238E27FC236}">
+                  <a16:creationId xmlns:a16="http://schemas.microsoft.com/office/drawing/2014/main" id="{BD32DB13-A2D5-7FAE-CD55-D1D97248EBD0}"/>
+                </a:ext>
+              </a:extLst>
+            </p:cNvPr>
+            <p:cNvCxnSpPr/>
+            <p:nvPr userDrawn="1"/>
+          </p:nvCxnSpPr>
+          <p:spPr>
+            <a:xfrm>
+              <a:off x="1431636" y="2899353"/>
+              <a:ext cx="0" cy="3565236"/>
+            </a:xfrm>
+            <a:prstGeom prst="line">
+              <a:avLst/>
+            </a:prstGeom>
+            <a:ln w="76200">
+              <a:solidFill>
+                <a:srgbClr val="3540A5"/>
+              </a:solidFill>
+            </a:ln>
+          </p:spPr>
+          <p:style>
+            <a:lnRef idx="1">
+              <a:schemeClr val="accent1"/>
+            </a:lnRef>
+            <a:fillRef idx="0">
+              <a:schemeClr val="accent1"/>
+            </a:fillRef>
+            <a:effectRef idx="0">
+              <a:schemeClr val="accent1"/>
+            </a:effectRef>
+            <a:fontRef idx="minor">
+              <a:schemeClr val="tx1"/>
+            </a:fontRef>
+          </p:style>
+        </p:cxnSp>
+        <p:cxnSp>
+          <p:nvCxnSpPr>
+            <p:cNvPr id="7" name="Straight Connector 6">
+              <a:extLst>
+                <a:ext uri="{FF2B5EF4-FFF2-40B4-BE49-F238E27FC236}">
+                  <a16:creationId xmlns:a16="http://schemas.microsoft.com/office/drawing/2014/main" id="{76BAA9DF-5596-0B10-4EA7-A0C0657A0387}"/>
+                </a:ext>
+              </a:extLst>
+            </p:cNvPr>
+            <p:cNvCxnSpPr/>
+            <p:nvPr userDrawn="1"/>
+          </p:nvCxnSpPr>
+          <p:spPr>
+            <a:xfrm>
+              <a:off x="1279236" y="3812829"/>
+              <a:ext cx="0" cy="2651760"/>
+            </a:xfrm>
+            <a:prstGeom prst="line">
+              <a:avLst/>
+            </a:prstGeom>
+            <a:ln w="76200">
+              <a:solidFill>
+                <a:srgbClr val="3540A5"/>
+              </a:solidFill>
+            </a:ln>
+          </p:spPr>
+          <p:style>
+            <a:lnRef idx="1">
+              <a:schemeClr val="accent1"/>
+            </a:lnRef>
+            <a:fillRef idx="0">
+              <a:schemeClr val="accent1"/>
+            </a:fillRef>
+            <a:effectRef idx="0">
+              <a:schemeClr val="accent1"/>
+            </a:effectRef>
+            <a:fontRef idx="minor">
+              <a:schemeClr val="tx1"/>
+            </a:fontRef>
+          </p:style>
+        </p:cxnSp>
+        <p:cxnSp>
+          <p:nvCxnSpPr>
+            <p:cNvPr id="10" name="Straight Connector 9">
+              <a:extLst>
+                <a:ext uri="{FF2B5EF4-FFF2-40B4-BE49-F238E27FC236}">
+                  <a16:creationId xmlns:a16="http://schemas.microsoft.com/office/drawing/2014/main" id="{0CFF5FEC-5C9A-595D-182C-61FA9A580993}"/>
+                </a:ext>
+              </a:extLst>
+            </p:cNvPr>
+            <p:cNvCxnSpPr/>
+            <p:nvPr userDrawn="1"/>
+          </p:nvCxnSpPr>
+          <p:spPr>
+            <a:xfrm>
+              <a:off x="1570182" y="4727229"/>
+              <a:ext cx="0" cy="1737360"/>
+            </a:xfrm>
+            <a:prstGeom prst="line">
+              <a:avLst/>
+            </a:prstGeom>
+            <a:ln w="76200">
+              <a:solidFill>
+                <a:srgbClr val="3540A5"/>
+              </a:solidFill>
+            </a:ln>
+          </p:spPr>
+          <p:style>
+            <a:lnRef idx="1">
+              <a:schemeClr val="accent1"/>
+            </a:lnRef>
+            <a:fillRef idx="0">
+              <a:schemeClr val="accent1"/>
+            </a:fillRef>
+            <a:effectRef idx="0">
+              <a:schemeClr val="accent1"/>
+            </a:effectRef>
+            <a:fontRef idx="minor">
+              <a:schemeClr val="tx1"/>
+            </a:fontRef>
+          </p:style>
+        </p:cxnSp>
+      </p:grpSp>
     </p:spTree>
     <p:extLst>
       <p:ext uri="{BB962C8B-B14F-4D97-AF65-F5344CB8AC3E}">
@@ -2800,10 +2805,12 @@
     <p:sldLayoutId id="2147483649" r:id="rId1"/>
     <p:sldLayoutId id="2147483650" r:id="rId2"/>
     <p:sldLayoutId id="2147483652" r:id="rId3"/>
-    <p:sldLayoutId id="2147483656" r:id="rId4"/>
-    <p:sldLayoutId id="2147483654" r:id="rId5"/>
-    <p:sldLayoutId id="2147483657" r:id="rId9"/>
+    <p:sldLayoutId id="2147483654" r:id="rId4"/>
+    <p:sldLayoutId id="2147483657" r:id="rId8"/>
+    <p:sldLayoutId id="2147483656" r:id="rId7"/>
+    <p:sldLayoutId id="2147483655" r:id="rId6"/>
   </p:sldLayoutIdLst>
+  <p:hf dt="0" ftr="0" hdr="0" sldNum="0"/>
   <p:txStyles>
     <p:titleStyle>
       <a:lvl1pPr algn="l" defTabSz="914400" eaLnBrk="1" hangingPunct="1" latinLnBrk="0" rtl="0">
@@ -2834,7 +2841,7 @@
         </a:spcBef>
         <a:buFont charset="0" panose="020B0604020202020204" pitchFamily="34" typeface="Arial"/>
         <a:buChar char="•"/>
-        <a:defRPr kern="1200" sz="2800">
+        <a:defRPr kern="1200" sz="1800">
           <a:solidFill>
             <a:schemeClr val="tx1"/>
           </a:solidFill>
@@ -2852,7 +2859,7 @@
         </a:spcBef>
         <a:buFont charset="0" panose="020B0604020202020204" pitchFamily="34" typeface="Arial"/>
         <a:buChar char="•"/>
-        <a:defRPr kern="1200" sz="2400">
+        <a:defRPr kern="1200" sz="1800">
           <a:solidFill>
             <a:schemeClr val="tx1"/>
           </a:solidFill>
@@ -2870,7 +2877,7 @@
         </a:spcBef>
         <a:buFont charset="0" panose="020B0604020202020204" pitchFamily="34" typeface="Arial"/>
         <a:buChar char="•"/>
-        <a:defRPr kern="1200" sz="2000">
+        <a:defRPr kern="1200" sz="1800">
           <a:solidFill>
             <a:schemeClr val="tx1"/>
           </a:solidFill>
@@ -3178,42 +3185,7 @@
           </a:p>
         </p:txBody>
       </p:sp>
-      <p:sp>
-        <p:nvSpPr>
-          <p:cNvPr id="4" name="Date Placeholder 3">
-            <a:extLst>
-              <a:ext uri="{FF2B5EF4-FFF2-40B4-BE49-F238E27FC236}">
-                <a16:creationId xmlns:a16="http://schemas.microsoft.com/office/drawing/2014/main" id="{0EAC885C-1DFA-597E-0698-509E28E0F85C}"/>
-              </a:ext>
-            </a:extLst>
-          </p:cNvPr>
-          <p:cNvSpPr>
-            <a:spLocks noGrp="1"/>
-          </p:cNvSpPr>
-          <p:nvPr>
-            <p:ph idx="10" sz="half" type="dt"/>
-          </p:nvPr>
-        </p:nvSpPr>
-        <p:spPr>
-          <a:xfrm>
-            <a:off x="0" y="6562295"/>
-            <a:ext cx="2743200" cy="365125"/>
-          </a:xfrm>
-        </p:spPr>
-        <p:txBody>
-          <a:bodyPr/>
-          <a:lstStyle/>
-          <a:p>
-            <a:pPr lvl="0" indent="0" marL="0">
-              <a:buNone/>
-            </a:pPr>
-            <a:r>
-              <a:rPr/>
-              <a:t>2024</a:t>
-            </a:r>
-          </a:p>
-        </p:txBody>
-      </p:sp>
+      <p:sp/>
     </p:spTree>
   </p:cSld>
 </p:sld>
@@ -3374,7 +3346,13 @@
       </p:grpSpPr>
       <p:sp>
         <p:nvSpPr>
-          <p:cNvPr id="2" name="Title 1"/>
+          <p:cNvPr id="2" name="Title 1">
+            <a:extLst>
+              <a:ext uri="{FF2B5EF4-FFF2-40B4-BE49-F238E27FC236}">
+                <a16:creationId xmlns:a16="http://schemas.microsoft.com/office/drawing/2014/main" id="{451B1580-D16B-B50C-E10B-3A06745DF9C9}"/>
+              </a:ext>
+            </a:extLst>
+          </p:cNvPr>
           <p:cNvSpPr>
             <a:spLocks noGrp="1"/>
           </p:cNvSpPr>
@@ -3384,8 +3362,8 @@
         </p:nvSpPr>
         <p:spPr>
           <a:xfrm>
-            <a:off x="722313" y="3305176"/>
-            <a:ext cx="7772400" cy="1021556"/>
+            <a:off x="1681018" y="2558473"/>
+            <a:ext cx="6973455" cy="3694545"/>
           </a:xfrm>
         </p:spPr>
         <p:txBody>
@@ -5142,13 +5120,7 @@
       </p:grpSpPr>
       <p:sp>
         <p:nvSpPr>
-          <p:cNvPr id="2" name="Title 1">
-            <a:extLst>
-              <a:ext uri="{FF2B5EF4-FFF2-40B4-BE49-F238E27FC236}">
-                <a16:creationId xmlns:a16="http://schemas.microsoft.com/office/drawing/2014/main" id="{DA7332E7-6922-874D-DC2B-A2F8A11AEBE8}"/>
-              </a:ext>
-            </a:extLst>
-          </p:cNvPr>
+          <p:cNvPr id="2" name="Title 1"/>
           <p:cNvSpPr>
             <a:spLocks noGrp="1"/>
           </p:cNvSpPr>
@@ -5156,7 +5128,12 @@
             <p:ph type="title"/>
           </p:nvPr>
         </p:nvSpPr>
-        <p:spPr/>
+        <p:spPr>
+          <a:xfrm>
+            <a:off x="457201" y="204787"/>
+            <a:ext cx="3008313" cy="871538"/>
+          </a:xfrm>
+        </p:spPr>
         <p:txBody>
           <a:bodyPr/>
           <a:lstStyle/>
@@ -5166,25 +5143,19 @@
             </a:pPr>
             <a:r>
               <a:rPr/>
-              <a:t>Glimpse(raw_data)</a:t>
-            </a:r>
-          </a:p>
-        </p:txBody>
-      </p:sp>
-      <p:sp>
-        <p:nvSpPr>
-          <p:cNvPr id="3" name="Content Placeholder 2">
-            <a:extLst>
-              <a:ext uri="{FF2B5EF4-FFF2-40B4-BE49-F238E27FC236}">
-                <a16:creationId xmlns:a16="http://schemas.microsoft.com/office/drawing/2014/main" id="{6DDEDE47-A0B3-B021-6D78-709CA34A1D24}"/>
-              </a:ext>
-            </a:extLst>
-          </p:cNvPr>
-          <p:cNvSpPr>
-            <a:spLocks noGrp="1"/>
-          </p:cNvSpPr>
-          <p:nvPr>
-            <p:ph idx="1"/>
+              <a:t>Data Analysis</a:t>
+            </a:r>
+          </a:p>
+        </p:txBody>
+      </p:sp>
+      <p:sp>
+        <p:nvSpPr>
+          <p:cNvPr id="4" name="Text Placeholder 3"/>
+          <p:cNvSpPr>
+            <a:spLocks noGrp="1"/>
+          </p:cNvSpPr>
+          <p:nvPr>
+            <p:ph idx="2" sz="half" type="body"/>
           </p:nvPr>
         </p:nvSpPr>
         <p:spPr/>
@@ -5196,29 +5167,10 @@
               <a:buNone/>
             </a:pPr>
             <a:r>
-              <a:rPr i="1">
-                <a:solidFill>
-                  <a:srgbClr val="60A0B0"/>
-                </a:solidFill>
-                <a:latin typeface="Courier"/>
-              </a:rPr>
-              <a:t>#To view our data with the new variable.</a:t>
-            </a:r>
-            <a:br/>
-            <a:r>
-              <a:rPr>
-                <a:solidFill>
-                  <a:srgbClr val="06287E"/>
-                </a:solidFill>
-                <a:latin typeface="Courier"/>
-              </a:rPr>
-              <a:t>glimpse</a:t>
-            </a:r>
-            <a:r>
-              <a:rPr>
-                <a:latin typeface="Courier"/>
-              </a:rPr>
-              <a:t>(raw_data)</a:t>
+              <a:rPr>
+                <a:latin typeface="Courier"/>
+              </a:rPr>
+              <a:t>## The year range of our data is  1942 to  2013 .</a:t>
             </a:r>
           </a:p>
           <a:p>
@@ -5229,78 +5181,42 @@
               <a:rPr>
                 <a:latin typeface="Courier"/>
               </a:rPr>
-              <a:t>## Rows: 50
-## Columns: 66
-## $ BoxOfficeMojo        &lt;int&gt; 0, 0, 0, 0, 0, 1, 0, 0, 0, 0, 0, 0, 0, 0, 0, 0, 0…
-## $ IMDB                 &lt;int&gt; 1, 1, 1, 1, 1, 1, 1, 1, 1, 1, 1, 1, 1, 1, 1, 1, 1…
-## $ OriginalOrder        &lt;int&gt; 1, 2, 3, 4, 5, 6, 7, 8, 9, 10, 11, 12, 13, 14, 15…
-## $ FilmName             &lt;chr&gt; "Shawshank_Classic", "Godfather_Classic", "Godfat…
-## $ Classic              &lt;dbl&gt; 0.87, 0.91, 0.74, 0.83, 0.49, 0.62, 0.70, 0.84, 0…
-## $ ImDb_A               &lt;int&gt; 1, 1, 1, 1, 1, 1, 1, 1, 1, 1, 1, 1, 1, 1, 1, 1, 1…
-## $ Boxofficemojo_A      &lt;int&gt; 0, 0, 0, 0, 0, 1, 0, 0, 1, 0, 0, 0, 0, 0, 0, 0, 0…
-## $ Year                 &lt;int&gt; 1994, 1972, 1974, 1994, 1966, 2008, 1957, 1993, 2…
-## $ InflatedBudget       &lt;dbl&gt; 38705260, 32966408, 60592133, 1238568, 8501703, 1…
-## $ TotalGross           &lt;dbl&gt; 28341469, 245066411, 47542841, 213928762, 2510000…
-## $ InflatedGross        &lt;dbl&gt; 43878557, 1346493234, 221594012, 331206735, 17782…
-## $ V15                  &lt;chr&gt; "Shawshank", "Godfather", "Godfather p 2", "Pulp …
-## $ Check_enj_label      &lt;chr&gt; "Shawshank_enj", "Godfather_enj", "Godfather p 2_…
-## $ Proportion_male      &lt;dbl&gt; 0.38, 0.38, 0.42, 0.40, 0.44, 0.31, 0.33, 0.32, 0…
-## $ Appr_alphas          &lt;dbl&gt; 0.904, 0.938, 0.914, 0.835, 0.848, 0.923, 0.944, …
-## $ Enj_alphas           &lt;dbl&gt; 0.878, 0.906, 0.897, 0.918, 0.954, 0.838, 0.869, …
-## $ Enjoyment            &lt;dbl&gt; 5.508251, 5.428571, 5.254545, 5.763052, 4.911111,…
-## $ Enjoyment_SD         &lt;dbl&gt; 1.341305, 1.325478, 1.242200, 1.118373, 1.089600,…
-## $ ViewerCount_enj      &lt;int&gt; 101, 77, 55, 83, 30, 188, 53, 78, 113, 112, 84, 1…
-## $ Check_appr_label     &lt;chr&gt; "Shawshank_appr", "Godfather_appr", "Godfather p …
-## $ Appreciation         &lt;dbl&gt; 6.217822, 5.447368, 5.351852, 4.947791, 4.440860,…
-## $ Appr_SD              &lt;dbl&gt; 1.0692008, 1.3505035, 1.3681257, 1.3748436, 1.062…
-## $ ViewerCount_appr     &lt;int&gt; 101, 76, 54, 83, 31, 188, 52, 78, 112, 112, 84, 1…
-## $ Crime                &lt;int&gt; 1, 1, 1, 1, 0, 1, 1, 0, 0, 0, 0, 0, 0, 1, 0, 0, 0…
-## $ Drama                &lt;int&gt; 1, 1, 1, 1, 0, 1, 1, 1, 0, 1, 0, 0, 1, 1, 1, 0, 0…
-## $ Western              &lt;int&gt; 0, 0, 0, 0, 1, 0, 0, 0, 0, 0, 0, 0, 0, 0, 0, 0, 0…
-## $ Action               &lt;int&gt; 0, 0, 0, 0, 0, 1, 0, 0, 0, 0, 1, 0, 0, 0, 0, 1, 1…
-## $ Biography            &lt;int&gt; 0, 0, 0, 0, 0, 0, 0, 1, 0, 0, 0, 0, 0, 1, 0, 0, 0…
-## $ History              &lt;int&gt; 0, 0, 0, 0, 0, 0, 0, 1, 0, 0, 0, 0, 0, 0, 0, 0, 0…
-## $ Adventure            &lt;int&gt; 0, 0, 0, 0, 0, 0, 0, 0, 1, 0, 1, 1, 0, 0, 0, 0, 1…
-## $ Fantasy              &lt;int&gt; 0, 0, 0, 0, 0, 0, 0, 0, 1, 0, 1, 1, 0, 0, 0, 0, 1…
-## $ Mystery              &lt;int&gt; 0, 0, 0, 0, 0, 0, 0, 0, 0, 0, 0, 0, 0, 0, 0, 1, 0…
-## $ SciFi                &lt;int&gt; 0, 0, 0, 0, 0, 0, 0, 0, 0, 0, 0, 0, 0, 0, 0, 1, 0…
-## $ Romance              &lt;int&gt; 0, 0, 0, 0, 0, 0, 0, 0, 0, 0, 0, 0, 0, 0, 0, 0, 0…
-## $ Thriller             &lt;int&gt; 0, 0, 0, 0, 0, 0, 0, 0, 0, 0, 0, 0, 0, 0, 0, 0, 0…
-## $ War                  &lt;int&gt; 0, 0, 0, 0, 0, 0, 0, 0, 0, 0, 0, 0, 0, 0, 0, 0, 0…
-## $ Family               &lt;int&gt; 0, 0, 0, 0, 0, 0, 0, 0, 0, 0, 0, 0, 0, 0, 0, 0, 0…
-## $ Animation            &lt;int&gt; 0, 0, 0, 0, 0, 0, 0, 0, 0, 0, 0, 0, 0, 0, 0, 0, 0…
-## $ Comedy               &lt;int&gt; 0, 0, 0, 0, 0, 0, 0, 0, 0, 0, 0, 0, 0, 0, 0, 0, 0…
-## $ MovieImdbID          &lt;int&gt; 111161, 442781, 71562, 110912, 60196, 468569, 500…
-## $ UserRank             &lt;chr&gt; "bronze member", "administrator", "gold member", …
-## $ SubDownloadsCnt      &lt;int&gt; 1124, 99, 5510, 456, 140, 5524, 12689, 734, 535, …
-## $ TotalWords           &lt;int&gt; 4645, 12610, 2002, 16555, 4609, 12833, 12738, 396…
-## $ HarmVirtue           &lt;int&gt; 7, 40, 3, 11, 10, 36, 9, 5, 23, 18, 0, 32, 5, 26,…
-## $ HarmVirtueratio      &lt;dbl&gt; 0.001507, 0.003172, 0.001499, 0.000664, 0.002170,…
-## $ HarmVice             &lt;int&gt; 8, 57, 10, 54, 16, 48, 69, 6, 55, 79, 12, 28, 15,…
-## $ HarmViceratio        &lt;dbl&gt; 0.001722, 0.004520, 0.004995, 0.003262, 0.003471,…
-## $ FairnessVirtue       &lt;int&gt; 4, 0, 1, 4, 6, 12, 17, 0, 2, 6, 0, 5, 2, 2, 1, 1,…
-## $ FairnessVirtueratio  &lt;dbl&gt; 0.000861, 0.000000, 0.000500, 0.000242, 0.001302,…
-## $ FairnessVice         &lt;int&gt; 0, 0, 0, 0, 0, 0, 3, 0, 0, 0, 0, 1, 0, 2, 1, 1, 0…
-## $ FairnessViceratio    &lt;dbl&gt; 0.00000, 0.00000, 0.00000, 0.00000, 0.00000, 0.00…
-## $ IngroupVirtue        &lt;int&gt; 7, 16, 10, 8, 2, 22, 2, 4, 4, 21, 4, 10, 5, 28, 2…
-## $ IngroupVirtueratio   &lt;dbl&gt; 0.001507, 0.001269, 0.004995, 0.000483, 0.000434,…
-## $ IngroupVice          &lt;int&gt; 1, 2, 0, 1, 4, 4, 0, 1, 16, 6, 1, 20, 1, 0, 6, 5,…
-## $ IngroupViceratio     &lt;dbl&gt; 0.000215, 0.000159, 0.000000, 0.000060, 0.000868,…
-## $ AuthorityVirtue      &lt;int&gt; 7, 136, 18, 31, 20, 31, 46, 12, 24, 22, 3, 20, 9,…
-## $ AuthorityVirtueratio &lt;dbl&gt; 0.001507, 0.010785, 0.008991, 0.001873, 0.004339,…
-## $ AuthorityVice        &lt;int&gt; 0, 3, 1, 3, 4, 3, 0, 1, 5, 0, 8, 5, 2, 3, 0, 1, 2…
-## $ AuthorityViceratio   &lt;dbl&gt; 0.000000, 0.000238, 0.000500, 0.000181, 0.000868,…
-## $ PurityVirtue         &lt;int&gt; 8, 10, 2, 8, 3, 7, 5, 0, 0, 9, 0, 2, 2, 6, 2, 2, …
-## $ PurityVirtueratio    &lt;dbl&gt; 0.001722, 0.000793, 0.000999, 0.000483, 0.000651,…
-## $ PurityVice           &lt;int&gt; 1, 15, 3, 10, 17, 3, 5, 0, 7, 10, 0, 4, 4, 9, 5, …
-## $ PurityViceratio      &lt;dbl&gt; 0.000215, 0.001190, 0.001499, 0.000604, 0.003688,…
-## $ MoralityGeneral      &lt;int&gt; 14, 59, 14, 104, 30, 48, 35, 25, 13, 32, 6, 40, 3…
-## $ MoralityGeneralratio &lt;dbl&gt; 0.003014, 0.004679, 0.006993, 0.006282, 0.006509,…
-## $ Proportion_female    &lt;dbl&gt; 0.62, 0.62, 0.58, 0.60, 0.56, 0.69, 0.67, 0.68, 0…</a:t>
-            </a:r>
-          </a:p>
-        </p:txBody>
-      </p:sp>
+              <a:t>## 
+## Our dataset is made up of  50  films.</a:t>
+            </a:r>
+          </a:p>
+        </p:txBody>
+      </p:sp>
+      <p:pic>
+        <p:nvPicPr>
+          <p:cNvPr descr="Slides_files/figure-pptx/unnamed-chunk-5-1.png" id="0" name="Picture 1"/>
+          <p:cNvPicPr>
+            <a:picLocks noGrp="1" noChangeAspect="1"/>
+          </p:cNvPicPr>
+          <p:nvPr/>
+        </p:nvPicPr>
+        <p:blipFill>
+          <a:blip r:embed="rId2"/>
+          <a:stretch>
+            <a:fillRect/>
+          </a:stretch>
+        </p:blipFill>
+        <p:spPr bwMode="auto">
+          <a:xfrm>
+            <a:off x="3568700" y="355600"/>
+            <a:ext cx="5105400" cy="4089400"/>
+          </a:xfrm>
+          <a:prstGeom prst="rect">
+            <a:avLst/>
+          </a:prstGeom>
+          <a:noFill/>
+          <a:ln w="9525">
+            <a:noFill/>
+            <a:headEnd/>
+            <a:tailEnd/>
+          </a:ln>
+        </p:spPr>
+      </p:pic>
     </p:spTree>
   </p:cSld>
 </p:sld>
@@ -5328,7 +5244,7 @@
           <p:cNvPr id="2" name="Title 1">
             <a:extLst>
               <a:ext uri="{FF2B5EF4-FFF2-40B4-BE49-F238E27FC236}">
-                <a16:creationId xmlns:a16="http://schemas.microsoft.com/office/drawing/2014/main" id="{054181AB-C9D2-E6D9-86AD-D8CC39B3FEFB}"/>
+                <a16:creationId xmlns:a16="http://schemas.microsoft.com/office/drawing/2014/main" id="{DA7332E7-6922-874D-DC2B-A2F8A11AEBE8}"/>
               </a:ext>
             </a:extLst>
           </p:cNvPr>
@@ -5339,12 +5255,7 @@
             <p:ph type="title"/>
           </p:nvPr>
         </p:nvSpPr>
-        <p:spPr>
-          <a:xfrm>
-            <a:off x="839788" y="457200"/>
-            <a:ext cx="3932237" cy="1600200"/>
-          </a:xfrm>
-        </p:spPr>
+        <p:spPr/>
         <p:txBody>
           <a:bodyPr/>
           <a:lstStyle/>
@@ -5354,59 +5265,14 @@
             </a:pPr>
             <a:r>
               <a:rPr/>
-              <a:t>Data Analysis</a:t>
-            </a:r>
-          </a:p>
-        </p:txBody>
-      </p:sp>
-      <p:sp>
-        <p:nvSpPr>
-          <p:cNvPr id="4" name="Text Placeholder 3">
-            <a:extLst>
-              <a:ext uri="{FF2B5EF4-FFF2-40B4-BE49-F238E27FC236}">
-                <a16:creationId xmlns:a16="http://schemas.microsoft.com/office/drawing/2014/main" id="{45A73796-F46A-DF49-5C20-882964226AE5}"/>
-              </a:ext>
-            </a:extLst>
-          </p:cNvPr>
-          <p:cNvSpPr>
-            <a:spLocks noGrp="1"/>
-          </p:cNvSpPr>
-          <p:nvPr>
-            <p:ph idx="2" sz="half" type="body"/>
-          </p:nvPr>
-        </p:nvSpPr>
-        <p:spPr/>
-        <p:txBody>
-          <a:bodyPr/>
-          <a:lstStyle/>
-          <a:p>
-            <a:pPr lvl="0" indent="0">
-              <a:buNone/>
-            </a:pPr>
-            <a:r>
-              <a:rPr>
-                <a:latin typeface="Courier"/>
-              </a:rPr>
-              <a:t>## The year range of our data is  1942 to  2013 .</a:t>
-            </a:r>
-          </a:p>
-          <a:p>
-            <a:pPr lvl="0" indent="0">
-              <a:buNone/>
-            </a:pPr>
-            <a:r>
-              <a:rPr>
-                <a:latin typeface="Courier"/>
-              </a:rPr>
-              <a:t>## 
-## Our dataset is made up of  50  films.</a:t>
+              <a:t>Film Count by Year</a:t>
             </a:r>
           </a:p>
         </p:txBody>
       </p:sp>
       <p:pic>
         <p:nvPicPr>
-          <p:cNvPr descr="Slides_files/figure-pptx/unnamed-chunk-5-1.png" id="0" name="Picture 1"/>
+          <p:cNvPr descr="Slides_files/figure-pptx/unnamed-chunk-6-1.png" id="0" name="Picture 1"/>
           <p:cNvPicPr>
             <a:picLocks noGrp="1" noChangeAspect="1"/>
           </p:cNvPicPr>
@@ -5420,8 +5286,8 @@
         </p:blipFill>
         <p:spPr bwMode="auto">
           <a:xfrm>
-            <a:off x="5232400" y="977900"/>
-            <a:ext cx="6083300" cy="4864100"/>
+            <a:off x="3378200" y="1816100"/>
+            <a:ext cx="5435600" cy="4343400"/>
           </a:xfrm>
           <a:prstGeom prst="rect">
             <a:avLst/>
@@ -5458,10 +5324,10 @@
       </p:grpSpPr>
       <p:sp>
         <p:nvSpPr>
-          <p:cNvPr id="2" name="Title 1">
+          <p:cNvPr id="3" name="Content Placeholder 2">
             <a:extLst>
               <a:ext uri="{FF2B5EF4-FFF2-40B4-BE49-F238E27FC236}">
-                <a16:creationId xmlns:a16="http://schemas.microsoft.com/office/drawing/2014/main" id="{DA7332E7-6922-874D-DC2B-A2F8A11AEBE8}"/>
+                <a16:creationId xmlns:a16="http://schemas.microsoft.com/office/drawing/2014/main" id="{6DDEDE47-A0B3-B021-6D78-709CA34A1D24}"/>
               </a:ext>
             </a:extLst>
           </p:cNvPr>
@@ -5469,7 +5335,7 @@
             <a:spLocks noGrp="1"/>
           </p:cNvSpPr>
           <p:nvPr>
-            <p:ph type="title"/>
+            <p:ph idx="1"/>
           </p:nvPr>
         </p:nvSpPr>
         <p:spPr/>
@@ -5482,41 +5348,11 @@
             </a:pPr>
             <a:r>
               <a:rPr/>
-              <a:t>Film Count by Year</a:t>
-            </a:r>
-          </a:p>
-        </p:txBody>
-      </p:sp>
-      <p:pic>
-        <p:nvPicPr>
-          <p:cNvPr descr="Slides_files/figure-pptx/unnamed-chunk-6-1.png" id="0" name="Picture 1"/>
-          <p:cNvPicPr>
-            <a:picLocks noGrp="1" noChangeAspect="1"/>
-          </p:cNvPicPr>
-          <p:nvPr/>
-        </p:nvPicPr>
-        <p:blipFill>
-          <a:blip r:embed="rId2"/>
-          <a:stretch>
-            <a:fillRect/>
-          </a:stretch>
-        </p:blipFill>
-        <p:spPr bwMode="auto">
-          <a:xfrm>
-            <a:off x="3378200" y="1816100"/>
-            <a:ext cx="5435600" cy="4343400"/>
-          </a:xfrm>
-          <a:prstGeom prst="rect">
-            <a:avLst/>
-          </a:prstGeom>
-          <a:noFill/>
-          <a:ln w="9525">
-            <a:noFill/>
-            <a:headEnd/>
-            <a:tailEnd/>
-          </a:ln>
-        </p:spPr>
-      </p:pic>
+              <a:t> ## Data Limitations</a:t>
+            </a:r>
+          </a:p>
+        </p:txBody>
+      </p:sp>
     </p:spTree>
   </p:cSld>
 </p:sld>
@@ -5966,7 +5802,7 @@
         <a:srgbClr val="E7E6E6"/>
       </a:lt2>
       <a:accent1>
-        <a:srgbClr val="5B9BD5"/>
+        <a:srgbClr val="4472C4"/>
       </a:accent1>
       <a:accent2>
         <a:srgbClr val="ED7D31"/>
@@ -5978,7 +5814,7 @@
         <a:srgbClr val="FFC000"/>
       </a:accent4>
       <a:accent5>
-        <a:srgbClr val="4472C4"/>
+        <a:srgbClr val="5B9BD5"/>
       </a:accent5>
       <a:accent6>
         <a:srgbClr val="70AD47"/>
@@ -5995,9 +5831,9 @@
         <a:latin typeface="Calibri Light" panose="020F0302020204030204"/>
         <a:ea typeface=""/>
         <a:cs typeface=""/>
-        <a:font script="Jpan" typeface="ＭＳ Ｐゴシック"/>
+        <a:font script="Jpan" typeface="游ゴシック Light"/>
         <a:font script="Hang" typeface="맑은 고딕"/>
-        <a:font script="Hans" typeface="宋体"/>
+        <a:font script="Hans" typeface="等线 Light"/>
         <a:font script="Hant" typeface="新細明體"/>
         <a:font script="Arab" typeface="Times New Roman"/>
         <a:font script="Hebr" typeface="Times New Roman"/>
@@ -6025,14 +5861,31 @@
         <a:font script="Viet" typeface="Times New Roman"/>
         <a:font script="Uigh" typeface="Microsoft Uighur"/>
         <a:font script="Geor" typeface="Sylfaen"/>
+        <a:font script="Armn" typeface="Arial"/>
+        <a:font script="Bugi" typeface="Leelawadee UI"/>
+        <a:font script="Bopo" typeface="Microsoft JhengHei"/>
+        <a:font script="Java" typeface="Javanese Text"/>
+        <a:font script="Lisu" typeface="Segoe UI"/>
+        <a:font script="Mymr" typeface="Myanmar Text"/>
+        <a:font script="Nkoo" typeface="Ebrima"/>
+        <a:font script="Olck" typeface="Nirmala UI"/>
+        <a:font script="Osma" typeface="Ebrima"/>
+        <a:font script="Phag" typeface="Phagspa"/>
+        <a:font script="Syrn" typeface="Estrangelo Edessa"/>
+        <a:font script="Syrj" typeface="Estrangelo Edessa"/>
+        <a:font script="Syre" typeface="Estrangelo Edessa"/>
+        <a:font script="Sora" typeface="Nirmala UI"/>
+        <a:font script="Tale" typeface="Microsoft Tai Le"/>
+        <a:font script="Talu" typeface="Microsoft New Tai Lue"/>
+        <a:font script="Tfng" typeface="Ebrima"/>
       </a:majorFont>
       <a:minorFont>
         <a:latin typeface="Calibri" panose="020F0502020204030204"/>
         <a:ea typeface=""/>
         <a:cs typeface=""/>
-        <a:font script="Jpan" typeface="ＭＳ Ｐゴシック"/>
+        <a:font script="Jpan" typeface="游ゴシック"/>
         <a:font script="Hang" typeface="맑은 고딕"/>
-        <a:font script="Hans" typeface="宋体"/>
+        <a:font script="Hans" typeface="等线"/>
         <a:font script="Hant" typeface="新細明體"/>
         <a:font script="Arab" typeface="Arial"/>
         <a:font script="Hebr" typeface="Arial"/>
@@ -6060,6 +5913,23 @@
         <a:font script="Viet" typeface="Arial"/>
         <a:font script="Uigh" typeface="Microsoft Uighur"/>
         <a:font script="Geor" typeface="Sylfaen"/>
+        <a:font script="Armn" typeface="Arial"/>
+        <a:font script="Bugi" typeface="Leelawadee UI"/>
+        <a:font script="Bopo" typeface="Microsoft JhengHei"/>
+        <a:font script="Java" typeface="Javanese Text"/>
+        <a:font script="Lisu" typeface="Segoe UI"/>
+        <a:font script="Mymr" typeface="Myanmar Text"/>
+        <a:font script="Nkoo" typeface="Ebrima"/>
+        <a:font script="Olck" typeface="Nirmala UI"/>
+        <a:font script="Osma" typeface="Ebrima"/>
+        <a:font script="Phag" typeface="Phagspa"/>
+        <a:font script="Syrn" typeface="Estrangelo Edessa"/>
+        <a:font script="Syrj" typeface="Estrangelo Edessa"/>
+        <a:font script="Syre" typeface="Estrangelo Edessa"/>
+        <a:font script="Sora" typeface="Nirmala UI"/>
+        <a:font script="Tale" typeface="Microsoft Tai Le"/>
+        <a:font script="Talu" typeface="Microsoft New Tai Lue"/>
+        <a:font script="Tfng" typeface="Ebrima"/>
       </a:minorFont>
     </a:fontScheme>
     <a:fmtScheme name="Office">

</xml_diff>

<commit_message>
genre app vs enjoyment
</commit_message>
<xml_diff>
--- a/Slides.pptx
+++ b/Slides.pptx
@@ -21,6 +21,8 @@
     <p:sldId id="269" r:id="rId15"/>
     <p:sldId id="270" r:id="rId16"/>
     <p:sldId id="271" r:id="rId17"/>
+    <p:sldId id="272" r:id="rId18"/>
+    <p:sldId id="273" r:id="rId19"/>
   </p:sldIdLst>
   <p:sldSz cx="12192000" cy="6858000"/>
   <p:notesSz cx="6858000" cy="9144000"/>
@@ -3592,10 +3594,10 @@
       </p:grpSpPr>
       <p:sp>
         <p:nvSpPr>
-          <p:cNvPr id="2" name="Title 1">
+          <p:cNvPr id="4" name="Text Placeholder 3">
             <a:extLst>
               <a:ext uri="{FF2B5EF4-FFF2-40B4-BE49-F238E27FC236}">
-                <a16:creationId xmlns:a16="http://schemas.microsoft.com/office/drawing/2014/main" id="{DA7332E7-6922-874D-DC2B-A2F8A11AEBE8}"/>
+                <a16:creationId xmlns:a16="http://schemas.microsoft.com/office/drawing/2014/main" id="{45A73796-F46A-DF49-5C20-882964226AE5}"/>
               </a:ext>
             </a:extLst>
           </p:cNvPr>
@@ -3603,7 +3605,7 @@
             <a:spLocks noGrp="1"/>
           </p:cNvSpPr>
           <p:nvPr>
-            <p:ph type="title"/>
+            <p:ph idx="2" sz="half" type="body"/>
           </p:nvPr>
         </p:nvSpPr>
         <p:spPr/>
@@ -3614,13 +3616,507 @@
             <a:pPr lvl="0" indent="0" marL="0">
               <a:buNone/>
             </a:pPr>
-            <a:r>
-              <a:rPr/>
-              <a:t>Let see what movie is actually the best.</a:t>
-            </a:r>
-          </a:p>
-        </p:txBody>
-      </p:sp>
+          </a:p>
+          <a:p>
+            <a:pPr lvl="0" indent="0">
+              <a:buNone/>
+            </a:pPr>
+            <a:r>
+              <a:rPr>
+                <a:latin typeface="Courier"/>
+              </a:rPr>
+              <a:t>combined_df </a:t>
+            </a:r>
+            <a:r>
+              <a:rPr>
+                <a:solidFill>
+                  <a:srgbClr val="007020"/>
+                </a:solidFill>
+                <a:latin typeface="Courier"/>
+              </a:rPr>
+              <a:t>&lt;-</a:t>
+            </a:r>
+            <a:r>
+              <a:rPr>
+                <a:latin typeface="Courier"/>
+              </a:rPr>
+              <a:t> </a:t>
+            </a:r>
+            <a:r>
+              <a:rPr>
+                <a:solidFill>
+                  <a:srgbClr val="06287E"/>
+                </a:solidFill>
+                <a:latin typeface="Courier"/>
+              </a:rPr>
+              <a:t>merge</a:t>
+            </a:r>
+            <a:r>
+              <a:rPr>
+                <a:latin typeface="Courier"/>
+              </a:rPr>
+              <a:t>(genre_app, genre_enj, </a:t>
+            </a:r>
+            <a:r>
+              <a:rPr>
+                <a:solidFill>
+                  <a:srgbClr val="7D9029"/>
+                </a:solidFill>
+                <a:latin typeface="Courier"/>
+              </a:rPr>
+              <a:t>by=</a:t>
+            </a:r>
+            <a:r>
+              <a:rPr>
+                <a:solidFill>
+                  <a:srgbClr val="4070A0"/>
+                </a:solidFill>
+                <a:latin typeface="Courier"/>
+              </a:rPr>
+              <a:t>"genre"</a:t>
+            </a:r>
+            <a:r>
+              <a:rPr>
+                <a:latin typeface="Courier"/>
+              </a:rPr>
+              <a:t>, </a:t>
+            </a:r>
+            <a:r>
+              <a:rPr>
+                <a:solidFill>
+                  <a:srgbClr val="7D9029"/>
+                </a:solidFill>
+                <a:latin typeface="Courier"/>
+              </a:rPr>
+              <a:t>all=</a:t>
+            </a:r>
+            <a:r>
+              <a:rPr>
+                <a:solidFill>
+                  <a:srgbClr val="880000"/>
+                </a:solidFill>
+                <a:latin typeface="Courier"/>
+              </a:rPr>
+              <a:t>TRUE</a:t>
+            </a:r>
+            <a:r>
+              <a:rPr>
+                <a:latin typeface="Courier"/>
+              </a:rPr>
+              <a:t>)</a:t>
+            </a:r>
+            <a:br/>
+            <a:r>
+              <a:rPr>
+                <a:solidFill>
+                  <a:srgbClr val="06287E"/>
+                </a:solidFill>
+                <a:latin typeface="Courier"/>
+              </a:rPr>
+              <a:t>ggplot</a:t>
+            </a:r>
+            <a:r>
+              <a:rPr>
+                <a:latin typeface="Courier"/>
+              </a:rPr>
+              <a:t>(combined_df,</a:t>
+            </a:r>
+            <a:r>
+              <a:rPr>
+                <a:solidFill>
+                  <a:srgbClr val="06287E"/>
+                </a:solidFill>
+                <a:latin typeface="Courier"/>
+              </a:rPr>
+              <a:t>aes</a:t>
+            </a:r>
+            <a:r>
+              <a:rPr>
+                <a:latin typeface="Courier"/>
+              </a:rPr>
+              <a:t>(</a:t>
+            </a:r>
+            <a:r>
+              <a:rPr>
+                <a:solidFill>
+                  <a:srgbClr val="7D9029"/>
+                </a:solidFill>
+                <a:latin typeface="Courier"/>
+              </a:rPr>
+              <a:t>x=</a:t>
+            </a:r>
+            <a:r>
+              <a:rPr>
+                <a:latin typeface="Courier"/>
+              </a:rPr>
+              <a:t>genre)) </a:t>
+            </a:r>
+            <a:r>
+              <a:rPr>
+                <a:solidFill>
+                  <a:srgbClr val="4070A0"/>
+                </a:solidFill>
+                <a:latin typeface="Courier"/>
+              </a:rPr>
+              <a:t>+</a:t>
+            </a:r>
+            <a:r>
+              <a:rPr>
+                <a:latin typeface="Courier"/>
+              </a:rPr>
+              <a:t> </a:t>
+            </a:r>
+            <a:br/>
+            <a:r>
+              <a:rPr>
+                <a:latin typeface="Courier"/>
+              </a:rPr>
+              <a:t>          </a:t>
+            </a:r>
+            <a:r>
+              <a:rPr>
+                <a:solidFill>
+                  <a:srgbClr val="06287E"/>
+                </a:solidFill>
+                <a:latin typeface="Courier"/>
+              </a:rPr>
+              <a:t>geom_bar</a:t>
+            </a:r>
+            <a:r>
+              <a:rPr>
+                <a:latin typeface="Courier"/>
+              </a:rPr>
+              <a:t>(</a:t>
+            </a:r>
+            <a:r>
+              <a:rPr>
+                <a:solidFill>
+                  <a:srgbClr val="06287E"/>
+                </a:solidFill>
+                <a:latin typeface="Courier"/>
+              </a:rPr>
+              <a:t>aes</a:t>
+            </a:r>
+            <a:r>
+              <a:rPr>
+                <a:latin typeface="Courier"/>
+              </a:rPr>
+              <a:t>(</a:t>
+            </a:r>
+            <a:r>
+              <a:rPr>
+                <a:solidFill>
+                  <a:srgbClr val="7D9029"/>
+                </a:solidFill>
+                <a:latin typeface="Courier"/>
+              </a:rPr>
+              <a:t>y=</a:t>
+            </a:r>
+            <a:r>
+              <a:rPr>
+                <a:latin typeface="Courier"/>
+              </a:rPr>
+              <a:t>meanenj),</a:t>
+            </a:r>
+            <a:r>
+              <a:rPr>
+                <a:solidFill>
+                  <a:srgbClr val="7D9029"/>
+                </a:solidFill>
+                <a:latin typeface="Courier"/>
+              </a:rPr>
+              <a:t>stat=</a:t>
+            </a:r>
+            <a:r>
+              <a:rPr>
+                <a:solidFill>
+                  <a:srgbClr val="4070A0"/>
+                </a:solidFill>
+                <a:latin typeface="Courier"/>
+              </a:rPr>
+              <a:t>"identity"</a:t>
+            </a:r>
+            <a:r>
+              <a:rPr>
+                <a:latin typeface="Courier"/>
+              </a:rPr>
+              <a:t>,</a:t>
+            </a:r>
+            <a:r>
+              <a:rPr>
+                <a:solidFill>
+                  <a:srgbClr val="7D9029"/>
+                </a:solidFill>
+                <a:latin typeface="Courier"/>
+              </a:rPr>
+              <a:t>position=</a:t>
+            </a:r>
+            <a:r>
+              <a:rPr>
+                <a:solidFill>
+                  <a:srgbClr val="4070A0"/>
+                </a:solidFill>
+                <a:latin typeface="Courier"/>
+              </a:rPr>
+              <a:t>"dodge"</a:t>
+            </a:r>
+            <a:r>
+              <a:rPr>
+                <a:latin typeface="Courier"/>
+              </a:rPr>
+              <a:t>,</a:t>
+            </a:r>
+            <a:r>
+              <a:rPr>
+                <a:solidFill>
+                  <a:srgbClr val="7D9029"/>
+                </a:solidFill>
+                <a:latin typeface="Courier"/>
+              </a:rPr>
+              <a:t>col=</a:t>
+            </a:r>
+            <a:r>
+              <a:rPr>
+                <a:solidFill>
+                  <a:srgbClr val="4070A0"/>
+                </a:solidFill>
+                <a:latin typeface="Courier"/>
+              </a:rPr>
+              <a:t>"blue"</a:t>
+            </a:r>
+            <a:r>
+              <a:rPr>
+                <a:latin typeface="Courier"/>
+              </a:rPr>
+              <a:t>) </a:t>
+            </a:r>
+            <a:r>
+              <a:rPr>
+                <a:solidFill>
+                  <a:srgbClr val="4070A0"/>
+                </a:solidFill>
+                <a:latin typeface="Courier"/>
+              </a:rPr>
+              <a:t>+</a:t>
+            </a:r>
+            <a:br/>
+            <a:r>
+              <a:rPr>
+                <a:latin typeface="Courier"/>
+              </a:rPr>
+              <a:t>          </a:t>
+            </a:r>
+            <a:r>
+              <a:rPr>
+                <a:solidFill>
+                  <a:srgbClr val="06287E"/>
+                </a:solidFill>
+                <a:latin typeface="Courier"/>
+              </a:rPr>
+              <a:t>geom_bar</a:t>
+            </a:r>
+            <a:r>
+              <a:rPr>
+                <a:latin typeface="Courier"/>
+              </a:rPr>
+              <a:t>(</a:t>
+            </a:r>
+            <a:r>
+              <a:rPr>
+                <a:solidFill>
+                  <a:srgbClr val="7D9029"/>
+                </a:solidFill>
+                <a:latin typeface="Courier"/>
+              </a:rPr>
+              <a:t>position=</a:t>
+            </a:r>
+            <a:r>
+              <a:rPr>
+                <a:solidFill>
+                  <a:srgbClr val="4070A0"/>
+                </a:solidFill>
+                <a:latin typeface="Courier"/>
+              </a:rPr>
+              <a:t>"dodge"</a:t>
+            </a:r>
+            <a:r>
+              <a:rPr>
+                <a:latin typeface="Courier"/>
+              </a:rPr>
+              <a:t>) </a:t>
+            </a:r>
+            <a:r>
+              <a:rPr>
+                <a:solidFill>
+                  <a:srgbClr val="4070A0"/>
+                </a:solidFill>
+                <a:latin typeface="Courier"/>
+              </a:rPr>
+              <a:t>+</a:t>
+            </a:r>
+            <a:r>
+              <a:rPr>
+                <a:latin typeface="Courier"/>
+              </a:rPr>
+              <a:t>   </a:t>
+            </a:r>
+            <a:br/>
+            <a:r>
+              <a:rPr>
+                <a:latin typeface="Courier"/>
+              </a:rPr>
+              <a:t>          </a:t>
+            </a:r>
+            <a:r>
+              <a:rPr>
+                <a:solidFill>
+                  <a:srgbClr val="06287E"/>
+                </a:solidFill>
+                <a:latin typeface="Courier"/>
+              </a:rPr>
+              <a:t>geom_bar</a:t>
+            </a:r>
+            <a:r>
+              <a:rPr>
+                <a:latin typeface="Courier"/>
+              </a:rPr>
+              <a:t>(</a:t>
+            </a:r>
+            <a:r>
+              <a:rPr>
+                <a:solidFill>
+                  <a:srgbClr val="06287E"/>
+                </a:solidFill>
+                <a:latin typeface="Courier"/>
+              </a:rPr>
+              <a:t>aes</a:t>
+            </a:r>
+            <a:r>
+              <a:rPr>
+                <a:latin typeface="Courier"/>
+              </a:rPr>
+              <a:t>(</a:t>
+            </a:r>
+            <a:r>
+              <a:rPr>
+                <a:solidFill>
+                  <a:srgbClr val="7D9029"/>
+                </a:solidFill>
+                <a:latin typeface="Courier"/>
+              </a:rPr>
+              <a:t>y=</a:t>
+            </a:r>
+            <a:r>
+              <a:rPr>
+                <a:latin typeface="Courier"/>
+              </a:rPr>
+              <a:t>meanapp),</a:t>
+            </a:r>
+            <a:r>
+              <a:rPr>
+                <a:solidFill>
+                  <a:srgbClr val="7D9029"/>
+                </a:solidFill>
+                <a:latin typeface="Courier"/>
+              </a:rPr>
+              <a:t>stat=</a:t>
+            </a:r>
+            <a:r>
+              <a:rPr>
+                <a:solidFill>
+                  <a:srgbClr val="4070A0"/>
+                </a:solidFill>
+                <a:latin typeface="Courier"/>
+              </a:rPr>
+              <a:t>"identity"</a:t>
+            </a:r>
+            <a:r>
+              <a:rPr>
+                <a:latin typeface="Courier"/>
+              </a:rPr>
+              <a:t>,</a:t>
+            </a:r>
+            <a:r>
+              <a:rPr>
+                <a:solidFill>
+                  <a:srgbClr val="7D9029"/>
+                </a:solidFill>
+                <a:latin typeface="Courier"/>
+              </a:rPr>
+              <a:t>position=</a:t>
+            </a:r>
+            <a:r>
+              <a:rPr>
+                <a:solidFill>
+                  <a:srgbClr val="4070A0"/>
+                </a:solidFill>
+                <a:latin typeface="Courier"/>
+              </a:rPr>
+              <a:t>"dodge"</a:t>
+            </a:r>
+            <a:r>
+              <a:rPr>
+                <a:latin typeface="Courier"/>
+              </a:rPr>
+              <a:t>,</a:t>
+            </a:r>
+            <a:r>
+              <a:rPr>
+                <a:solidFill>
+                  <a:srgbClr val="7D9029"/>
+                </a:solidFill>
+                <a:latin typeface="Courier"/>
+              </a:rPr>
+              <a:t>col=</a:t>
+            </a:r>
+            <a:r>
+              <a:rPr>
+                <a:solidFill>
+                  <a:srgbClr val="4070A0"/>
+                </a:solidFill>
+                <a:latin typeface="Courier"/>
+              </a:rPr>
+              <a:t>"red"</a:t>
+            </a:r>
+            <a:r>
+              <a:rPr>
+                <a:latin typeface="Courier"/>
+              </a:rPr>
+              <a:t>)</a:t>
+            </a:r>
+          </a:p>
+        </p:txBody>
+      </p:sp>
+      <p:pic>
+        <p:nvPicPr>
+          <p:cNvPr descr="Slides_files/figure-pptx/unnamed-chunk-21-1.png" id="0" name="Picture 1"/>
+          <p:cNvPicPr>
+            <a:picLocks noGrp="1" noChangeAspect="1"/>
+          </p:cNvPicPr>
+          <p:nvPr/>
+        </p:nvPicPr>
+        <p:blipFill>
+          <a:blip r:embed="rId2"/>
+          <a:stretch>
+            <a:fillRect/>
+          </a:stretch>
+        </p:blipFill>
+        <p:spPr bwMode="auto">
+          <a:xfrm>
+            <a:off x="5232400" y="977900"/>
+            <a:ext cx="6083300" cy="4864100"/>
+          </a:xfrm>
+          <a:prstGeom prst="rect">
+            <a:avLst/>
+          </a:prstGeom>
+          <a:noFill/>
+          <a:ln w="9525">
+            <a:noFill/>
+            <a:headEnd/>
+            <a:tailEnd/>
+          </a:ln>
+        </p:spPr>
+      </p:pic>
     </p:spTree>
   </p:cSld>
 </p:sld>
@@ -3645,6 +4141,408 @@
       </p:grpSpPr>
       <p:sp>
         <p:nvSpPr>
+          <p:cNvPr id="4" name="Text Placeholder 3">
+            <a:extLst>
+              <a:ext uri="{FF2B5EF4-FFF2-40B4-BE49-F238E27FC236}">
+                <a16:creationId xmlns:a16="http://schemas.microsoft.com/office/drawing/2014/main" id="{45A73796-F46A-DF49-5C20-882964226AE5}"/>
+              </a:ext>
+            </a:extLst>
+          </p:cNvPr>
+          <p:cNvSpPr>
+            <a:spLocks noGrp="1"/>
+          </p:cNvSpPr>
+          <p:nvPr>
+            <p:ph idx="2" sz="half" type="body"/>
+          </p:nvPr>
+        </p:nvSpPr>
+        <p:spPr/>
+        <p:txBody>
+          <a:bodyPr/>
+          <a:lstStyle/>
+          <a:p>
+            <a:pPr lvl="0" indent="0" marL="0">
+              <a:buNone/>
+            </a:pPr>
+          </a:p>
+          <a:p>
+            <a:pPr lvl="0" indent="0">
+              <a:buNone/>
+            </a:pPr>
+            <a:r>
+              <a:rPr>
+                <a:solidFill>
+                  <a:srgbClr val="06287E"/>
+                </a:solidFill>
+                <a:latin typeface="Courier"/>
+              </a:rPr>
+              <a:t>library</a:t>
+            </a:r>
+            <a:r>
+              <a:rPr>
+                <a:latin typeface="Courier"/>
+              </a:rPr>
+              <a:t>(reshape2)</a:t>
+            </a:r>
+          </a:p>
+          <a:p>
+            <a:pPr lvl="0" indent="0">
+              <a:buNone/>
+            </a:pPr>
+            <a:r>
+              <a:rPr>
+                <a:latin typeface="Courier"/>
+              </a:rPr>
+              <a:t>## Warning: package 'reshape2' was built under R version 4.3.3</a:t>
+            </a:r>
+          </a:p>
+          <a:p>
+            <a:pPr lvl="0" indent="0">
+              <a:buNone/>
+            </a:pPr>
+            <a:r>
+              <a:rPr>
+                <a:latin typeface="Courier"/>
+              </a:rPr>
+              <a:t>## 
+## Attaching package: 'reshape2'</a:t>
+            </a:r>
+          </a:p>
+          <a:p>
+            <a:pPr lvl="0" indent="0">
+              <a:buNone/>
+            </a:pPr>
+            <a:r>
+              <a:rPr>
+                <a:latin typeface="Courier"/>
+              </a:rPr>
+              <a:t>## The following object is masked from 'package:tidyr':
+## 
+##     smiths</a:t>
+            </a:r>
+          </a:p>
+          <a:p>
+            <a:pPr lvl="0" indent="0">
+              <a:buNone/>
+            </a:pPr>
+            <a:r>
+              <a:rPr>
+                <a:latin typeface="Courier"/>
+              </a:rPr>
+              <a:t>combined_df.long</a:t>
+            </a:r>
+            <a:r>
+              <a:rPr>
+                <a:solidFill>
+                  <a:srgbClr val="007020"/>
+                </a:solidFill>
+                <a:latin typeface="Courier"/>
+              </a:rPr>
+              <a:t>&lt;-</a:t>
+            </a:r>
+            <a:r>
+              <a:rPr>
+                <a:solidFill>
+                  <a:srgbClr val="06287E"/>
+                </a:solidFill>
+                <a:latin typeface="Courier"/>
+              </a:rPr>
+              <a:t>melt</a:t>
+            </a:r>
+            <a:r>
+              <a:rPr>
+                <a:latin typeface="Courier"/>
+              </a:rPr>
+              <a:t>(combined_df)</a:t>
+            </a:r>
+          </a:p>
+          <a:p>
+            <a:pPr lvl="0" indent="0">
+              <a:buNone/>
+            </a:pPr>
+            <a:r>
+              <a:rPr>
+                <a:latin typeface="Courier"/>
+              </a:rPr>
+              <a:t>## Using genre as id variables</a:t>
+            </a:r>
+          </a:p>
+          <a:p>
+            <a:pPr lvl="0" indent="0">
+              <a:buNone/>
+            </a:pPr>
+            <a:r>
+              <a:rPr>
+                <a:solidFill>
+                  <a:srgbClr val="06287E"/>
+                </a:solidFill>
+                <a:latin typeface="Courier"/>
+              </a:rPr>
+              <a:t>ggplot</a:t>
+            </a:r>
+            <a:r>
+              <a:rPr>
+                <a:latin typeface="Courier"/>
+              </a:rPr>
+              <a:t>(combined_df.long,</a:t>
+            </a:r>
+            <a:r>
+              <a:rPr>
+                <a:solidFill>
+                  <a:srgbClr val="06287E"/>
+                </a:solidFill>
+                <a:latin typeface="Courier"/>
+              </a:rPr>
+              <a:t>aes</a:t>
+            </a:r>
+            <a:r>
+              <a:rPr>
+                <a:latin typeface="Courier"/>
+              </a:rPr>
+              <a:t>(genre,value,</a:t>
+            </a:r>
+            <a:r>
+              <a:rPr>
+                <a:solidFill>
+                  <a:srgbClr val="7D9029"/>
+                </a:solidFill>
+                <a:latin typeface="Courier"/>
+              </a:rPr>
+              <a:t>fill=</a:t>
+            </a:r>
+            <a:r>
+              <a:rPr>
+                <a:latin typeface="Courier"/>
+              </a:rPr>
+              <a:t>variable))</a:t>
+            </a:r>
+            <a:r>
+              <a:rPr>
+                <a:solidFill>
+                  <a:srgbClr val="4070A0"/>
+                </a:solidFill>
+                <a:latin typeface="Courier"/>
+              </a:rPr>
+              <a:t>+</a:t>
+            </a:r>
+            <a:br/>
+            <a:r>
+              <a:rPr>
+                <a:latin typeface="Courier"/>
+              </a:rPr>
+              <a:t>     </a:t>
+            </a:r>
+            <a:r>
+              <a:rPr>
+                <a:solidFill>
+                  <a:srgbClr val="06287E"/>
+                </a:solidFill>
+                <a:latin typeface="Courier"/>
+              </a:rPr>
+              <a:t>geom_bar</a:t>
+            </a:r>
+            <a:r>
+              <a:rPr>
+                <a:latin typeface="Courier"/>
+              </a:rPr>
+              <a:t>(</a:t>
+            </a:r>
+            <a:r>
+              <a:rPr>
+                <a:solidFill>
+                  <a:srgbClr val="7D9029"/>
+                </a:solidFill>
+                <a:latin typeface="Courier"/>
+              </a:rPr>
+              <a:t>stat=</a:t>
+            </a:r>
+            <a:r>
+              <a:rPr>
+                <a:solidFill>
+                  <a:srgbClr val="4070A0"/>
+                </a:solidFill>
+                <a:latin typeface="Courier"/>
+              </a:rPr>
+              <a:t>"identity"</a:t>
+            </a:r>
+            <a:r>
+              <a:rPr>
+                <a:latin typeface="Courier"/>
+              </a:rPr>
+              <a:t>,</a:t>
+            </a:r>
+            <a:r>
+              <a:rPr>
+                <a:solidFill>
+                  <a:srgbClr val="7D9029"/>
+                </a:solidFill>
+                <a:latin typeface="Courier"/>
+              </a:rPr>
+              <a:t>position=</a:t>
+            </a:r>
+            <a:r>
+              <a:rPr>
+                <a:solidFill>
+                  <a:srgbClr val="4070A0"/>
+                </a:solidFill>
+                <a:latin typeface="Courier"/>
+              </a:rPr>
+              <a:t>"dodge"</a:t>
+            </a:r>
+            <a:r>
+              <a:rPr>
+                <a:latin typeface="Courier"/>
+              </a:rPr>
+              <a:t>)</a:t>
+            </a:r>
+            <a:r>
+              <a:rPr>
+                <a:solidFill>
+                  <a:srgbClr val="4070A0"/>
+                </a:solidFill>
+                <a:latin typeface="Courier"/>
+              </a:rPr>
+              <a:t>+</a:t>
+            </a:r>
+            <a:r>
+              <a:rPr>
+                <a:solidFill>
+                  <a:srgbClr val="06287E"/>
+                </a:solidFill>
+                <a:latin typeface="Courier"/>
+              </a:rPr>
+              <a:t>facet_wrap</a:t>
+            </a:r>
+            <a:r>
+              <a:rPr>
+                <a:latin typeface="Courier"/>
+              </a:rPr>
+              <a:t>(</a:t>
+            </a:r>
+            <a:r>
+              <a:rPr>
+                <a:solidFill>
+                  <a:srgbClr val="4070A0"/>
+                </a:solidFill>
+                <a:latin typeface="Courier"/>
+              </a:rPr>
+              <a:t>~</a:t>
+            </a:r>
+            <a:r>
+              <a:rPr>
+                <a:latin typeface="Courier"/>
+              </a:rPr>
+              <a:t>genre)</a:t>
+            </a:r>
+          </a:p>
+        </p:txBody>
+      </p:sp>
+      <p:pic>
+        <p:nvPicPr>
+          <p:cNvPr descr="Slides_files/figure-pptx/unnamed-chunk-21-2.png" id="0" name="Picture 1"/>
+          <p:cNvPicPr>
+            <a:picLocks noGrp="1" noChangeAspect="1"/>
+          </p:cNvPicPr>
+          <p:nvPr/>
+        </p:nvPicPr>
+        <p:blipFill>
+          <a:blip r:embed="rId2"/>
+          <a:stretch>
+            <a:fillRect/>
+          </a:stretch>
+        </p:blipFill>
+        <p:spPr bwMode="auto">
+          <a:xfrm>
+            <a:off x="5232400" y="977900"/>
+            <a:ext cx="6083300" cy="4864100"/>
+          </a:xfrm>
+          <a:prstGeom prst="rect">
+            <a:avLst/>
+          </a:prstGeom>
+          <a:noFill/>
+          <a:ln w="9525">
+            <a:noFill/>
+            <a:headEnd/>
+            <a:tailEnd/>
+          </a:ln>
+        </p:spPr>
+      </p:pic>
+    </p:spTree>
+  </p:cSld>
+</p:sld>
+</file>
+
+<file path=ppt/slides/slide17.xml><?xml version="1.0" encoding="utf-8"?>
+<p:sld xmlns:a="http://schemas.openxmlformats.org/drawingml/2006/main" xmlns:r="http://schemas.openxmlformats.org/officeDocument/2006/relationships" xmlns:p="http://schemas.openxmlformats.org/presentationml/2006/main">
+  <p:cSld>
+    <p:spTree>
+      <p:nvGrpSpPr>
+        <p:cNvPr id="1" name=""/>
+        <p:cNvGrpSpPr/>
+        <p:nvPr/>
+      </p:nvGrpSpPr>
+      <p:grpSpPr>
+        <a:xfrm>
+          <a:off x="0" y="0"/>
+          <a:ext cx="0" cy="0"/>
+          <a:chOff x="0" y="0"/>
+          <a:chExt cx="0" cy="0"/>
+        </a:xfrm>
+      </p:grpSpPr>
+      <p:sp>
+        <p:nvSpPr>
+          <p:cNvPr id="2" name="Title 1">
+            <a:extLst>
+              <a:ext uri="{FF2B5EF4-FFF2-40B4-BE49-F238E27FC236}">
+                <a16:creationId xmlns:a16="http://schemas.microsoft.com/office/drawing/2014/main" id="{DA7332E7-6922-874D-DC2B-A2F8A11AEBE8}"/>
+              </a:ext>
+            </a:extLst>
+          </p:cNvPr>
+          <p:cNvSpPr>
+            <a:spLocks noGrp="1"/>
+          </p:cNvSpPr>
+          <p:nvPr>
+            <p:ph type="title"/>
+          </p:nvPr>
+        </p:nvSpPr>
+        <p:spPr/>
+        <p:txBody>
+          <a:bodyPr/>
+          <a:lstStyle/>
+          <a:p>
+            <a:pPr lvl="0" indent="0" marL="0">
+              <a:buNone/>
+            </a:pPr>
+            <a:r>
+              <a:rPr/>
+              <a:t>Let see what movie is actually the best.</a:t>
+            </a:r>
+          </a:p>
+        </p:txBody>
+      </p:sp>
+    </p:spTree>
+  </p:cSld>
+</p:sld>
+</file>
+
+<file path=ppt/slides/slide18.xml><?xml version="1.0" encoding="utf-8"?>
+<p:sld xmlns:a="http://schemas.openxmlformats.org/drawingml/2006/main" xmlns:r="http://schemas.openxmlformats.org/officeDocument/2006/relationships" xmlns:p="http://schemas.openxmlformats.org/presentationml/2006/main">
+  <p:cSld>
+    <p:spTree>
+      <p:nvGrpSpPr>
+        <p:cNvPr id="1" name=""/>
+        <p:cNvGrpSpPr/>
+        <p:nvPr/>
+      </p:nvGrpSpPr>
+      <p:grpSpPr>
+        <a:xfrm>
+          <a:off x="0" y="0"/>
+          <a:ext cx="0" cy="0"/>
+          <a:chOff x="0" y="0"/>
+          <a:chExt cx="0" cy="0"/>
+        </a:xfrm>
+      </p:grpSpPr>
+      <p:sp>
+        <p:nvSpPr>
           <p:cNvPr id="2" name="Title 1">
             <a:extLst>
               <a:ext uri="{FF2B5EF4-FFF2-40B4-BE49-F238E27FC236}">
@@ -4024,6 +4922,17 @@
               <a:rPr>
                 <a:latin typeface="Courier"/>
               </a:rPr>
+              <a:t>## Warning: package 'ggplot2' was built under R version 4.3.3</a:t>
+            </a:r>
+          </a:p>
+          <a:p>
+            <a:pPr lvl="0" indent="0">
+              <a:buNone/>
+            </a:pPr>
+            <a:r>
+              <a:rPr>
+                <a:latin typeface="Courier"/>
+              </a:rPr>
               <a:t>## ── Attaching core tidyverse packages ──────────────────────── tidyverse 2.0.0 ──
 ## ✔ dplyr     1.1.4     ✔ readr     2.1.5
 ## ✔ forcats   1.0.0     ✔ stringr   1.5.1
@@ -4113,6 +5022,17 @@
                 <a:latin typeface="Courier"/>
               </a:rPr>
               <a:t>#Loaded to arrange plots</a:t>
+            </a:r>
+          </a:p>
+          <a:p>
+            <a:pPr lvl="0" indent="0">
+              <a:buNone/>
+            </a:pPr>
+            <a:r>
+              <a:rPr>
+                <a:latin typeface="Courier"/>
+              </a:rPr>
+              <a:t>## Warning: package 'gridExtra' was built under R version 4.3.3</a:t>
             </a:r>
           </a:p>
           <a:p>

</xml_diff>

<commit_message>
Almost done with presentation. Need to change somethings.
</commit_message>
<xml_diff>
--- a/Slides.pptx
+++ b/Slides.pptx
@@ -21,7 +21,6 @@
     <p:sldId id="269" r:id="rId15"/>
     <p:sldId id="270" r:id="rId16"/>
     <p:sldId id="271" r:id="rId17"/>
-    <p:sldId id="272" r:id="rId18"/>
   </p:sldIdLst>
   <p:sldSz cx="12192000" cy="6858000"/>
   <p:notesSz cx="6858000" cy="9144000"/>
@@ -2664,8 +2663,8 @@
         </p:nvGrpSpPr>
         <p:grpSpPr>
           <a:xfrm rot="10800000">
-            <a:off x="10760364" y="0"/>
-            <a:ext cx="290946" cy="1825625"/>
+            <a:off x="10760364" y="-1"/>
+            <a:ext cx="290946" cy="1359673"/>
             <a:chOff x="1279236" y="3612391"/>
             <a:chExt cx="290946" cy="2852198"/>
           </a:xfrm>
@@ -3298,7 +3297,13 @@
       </p:grpSpPr>
       <p:sp>
         <p:nvSpPr>
-          <p:cNvPr id="2" name="Title 1"/>
+          <p:cNvPr id="2" name="Title 1">
+            <a:extLst>
+              <a:ext uri="{FF2B5EF4-FFF2-40B4-BE49-F238E27FC236}">
+                <a16:creationId xmlns:a16="http://schemas.microsoft.com/office/drawing/2014/main" id="{DA7332E7-6922-874D-DC2B-A2F8A11AEBE8}"/>
+              </a:ext>
+            </a:extLst>
+          </p:cNvPr>
           <p:cNvSpPr>
             <a:spLocks noGrp="1"/>
           </p:cNvSpPr>
@@ -3306,12 +3311,7 @@
             <p:ph type="title"/>
           </p:nvPr>
         </p:nvSpPr>
-        <p:spPr>
-          <a:xfrm>
-            <a:off x="457201" y="204787"/>
-            <a:ext cx="3008313" cy="871538"/>
-          </a:xfrm>
-        </p:spPr>
+        <p:spPr/>
         <p:txBody>
           <a:bodyPr/>
           <a:lstStyle/>
@@ -3322,34 +3322,6 @@
             <a:r>
               <a:rPr/>
               <a:t>InflatedGross v. InflatedBudget by Year</a:t>
-            </a:r>
-          </a:p>
-        </p:txBody>
-      </p:sp>
-      <p:sp>
-        <p:nvSpPr>
-          <p:cNvPr id="4" name="Text Placeholder 3"/>
-          <p:cNvSpPr>
-            <a:spLocks noGrp="1"/>
-          </p:cNvSpPr>
-          <p:nvPr>
-            <p:ph idx="2" sz="half" type="body"/>
-          </p:nvPr>
-        </p:nvSpPr>
-        <p:spPr/>
-        <p:txBody>
-          <a:bodyPr/>
-          <a:lstStyle/>
-          <a:p>
-            <a:pPr lvl="0" indent="0">
-              <a:buNone/>
-            </a:pPr>
-            <a:r>
-              <a:rPr>
-                <a:latin typeface="Courier"/>
-              </a:rPr>
-              <a:t>## `geom_smooth()` using method = 'loess' and formula = 'y ~ x'
-## `geom_smooth()` using method = 'loess' and formula = 'y ~ x'</a:t>
             </a:r>
           </a:p>
         </p:txBody>
@@ -3370,8 +3342,8 @@
         </p:blipFill>
         <p:spPr bwMode="auto">
           <a:xfrm>
-            <a:off x="3568700" y="355600"/>
-            <a:ext cx="5105400" cy="4089400"/>
+            <a:off x="3035300" y="1257300"/>
+            <a:ext cx="6121400" cy="4902200"/>
           </a:xfrm>
           <a:prstGeom prst="rect">
             <a:avLst/>
@@ -3490,7 +3462,7 @@
             </a:pPr>
             <a:r>
               <a:rPr/>
-              <a:t>Genres:Inflated Grossing v. Inflated Budget</a:t>
+              <a:t>Genres:Grossing v. Budget</a:t>
             </a:r>
           </a:p>
         </p:txBody>
@@ -3573,7 +3545,7 @@
             </a:pPr>
             <a:r>
               <a:rPr/>
-              <a:t>Female v. Male for Genre Mean Inflated Grossing</a:t>
+              <a:t>Female v. Male for Genre</a:t>
             </a:r>
           </a:p>
         </p:txBody>
@@ -3632,7 +3604,13 @@
       </p:grpSpPr>
       <p:sp>
         <p:nvSpPr>
-          <p:cNvPr id="2" name="Title 1"/>
+          <p:cNvPr id="2" name="Title 1">
+            <a:extLst>
+              <a:ext uri="{FF2B5EF4-FFF2-40B4-BE49-F238E27FC236}">
+                <a16:creationId xmlns:a16="http://schemas.microsoft.com/office/drawing/2014/main" id="{DA7332E7-6922-874D-DC2B-A2F8A11AEBE8}"/>
+              </a:ext>
+            </a:extLst>
+          </p:cNvPr>
           <p:cNvSpPr>
             <a:spLocks noGrp="1"/>
           </p:cNvSpPr>
@@ -3640,12 +3618,7 @@
             <p:ph type="title"/>
           </p:nvPr>
         </p:nvSpPr>
-        <p:spPr>
-          <a:xfrm>
-            <a:off x="457201" y="204787"/>
-            <a:ext cx="3008313" cy="871538"/>
-          </a:xfrm>
-        </p:spPr>
+        <p:spPr/>
         <p:txBody>
           <a:bodyPr/>
           <a:lstStyle/>
@@ -3656,490 +3629,6 @@
             <a:r>
               <a:rPr/>
               <a:t>Enjoyment v. Appreciation</a:t>
-            </a:r>
-          </a:p>
-        </p:txBody>
-      </p:sp>
-      <p:sp>
-        <p:nvSpPr>
-          <p:cNvPr id="4" name="Text Placeholder 3"/>
-          <p:cNvSpPr>
-            <a:spLocks noGrp="1"/>
-          </p:cNvSpPr>
-          <p:nvPr>
-            <p:ph idx="2" sz="half" type="body"/>
-          </p:nvPr>
-        </p:nvSpPr>
-        <p:spPr/>
-        <p:txBody>
-          <a:bodyPr/>
-          <a:lstStyle/>
-          <a:p>
-            <a:pPr lvl="0" indent="0">
-              <a:buNone/>
-            </a:pPr>
-            <a:r>
-              <a:rPr>
-                <a:latin typeface="Courier"/>
-              </a:rPr>
-              <a:t>combined_df </a:t>
-            </a:r>
-            <a:r>
-              <a:rPr>
-                <a:solidFill>
-                  <a:srgbClr val="007020"/>
-                </a:solidFill>
-                <a:latin typeface="Courier"/>
-              </a:rPr>
-              <a:t>&lt;-</a:t>
-            </a:r>
-            <a:r>
-              <a:rPr>
-                <a:latin typeface="Courier"/>
-              </a:rPr>
-              <a:t> </a:t>
-            </a:r>
-            <a:r>
-              <a:rPr>
-                <a:solidFill>
-                  <a:srgbClr val="06287E"/>
-                </a:solidFill>
-                <a:latin typeface="Courier"/>
-              </a:rPr>
-              <a:t>merge</a:t>
-            </a:r>
-            <a:r>
-              <a:rPr>
-                <a:latin typeface="Courier"/>
-              </a:rPr>
-              <a:t>(genre_app, genre_enj, </a:t>
-            </a:r>
-            <a:r>
-              <a:rPr>
-                <a:solidFill>
-                  <a:srgbClr val="7D9029"/>
-                </a:solidFill>
-                <a:latin typeface="Courier"/>
-              </a:rPr>
-              <a:t>by=</a:t>
-            </a:r>
-            <a:r>
-              <a:rPr>
-                <a:solidFill>
-                  <a:srgbClr val="4070A0"/>
-                </a:solidFill>
-                <a:latin typeface="Courier"/>
-              </a:rPr>
-              <a:t>"genre"</a:t>
-            </a:r>
-            <a:r>
-              <a:rPr>
-                <a:latin typeface="Courier"/>
-              </a:rPr>
-              <a:t>, </a:t>
-            </a:r>
-            <a:r>
-              <a:rPr>
-                <a:solidFill>
-                  <a:srgbClr val="7D9029"/>
-                </a:solidFill>
-                <a:latin typeface="Courier"/>
-              </a:rPr>
-              <a:t>all=</a:t>
-            </a:r>
-            <a:r>
-              <a:rPr>
-                <a:solidFill>
-                  <a:srgbClr val="880000"/>
-                </a:solidFill>
-                <a:latin typeface="Courier"/>
-              </a:rPr>
-              <a:t>TRUE</a:t>
-            </a:r>
-            <a:r>
-              <a:rPr>
-                <a:latin typeface="Courier"/>
-              </a:rPr>
-              <a:t>)</a:t>
-            </a:r>
-            <a:br/>
-            <a:r>
-              <a:rPr>
-                <a:solidFill>
-                  <a:srgbClr val="06287E"/>
-                </a:solidFill>
-                <a:latin typeface="Courier"/>
-              </a:rPr>
-              <a:t>ggplot</a:t>
-            </a:r>
-            <a:r>
-              <a:rPr>
-                <a:latin typeface="Courier"/>
-              </a:rPr>
-              <a:t>(combined_df,</a:t>
-            </a:r>
-            <a:r>
-              <a:rPr>
-                <a:solidFill>
-                  <a:srgbClr val="06287E"/>
-                </a:solidFill>
-                <a:latin typeface="Courier"/>
-              </a:rPr>
-              <a:t>aes</a:t>
-            </a:r>
-            <a:r>
-              <a:rPr>
-                <a:latin typeface="Courier"/>
-              </a:rPr>
-              <a:t>(</a:t>
-            </a:r>
-            <a:r>
-              <a:rPr>
-                <a:solidFill>
-                  <a:srgbClr val="7D9029"/>
-                </a:solidFill>
-                <a:latin typeface="Courier"/>
-              </a:rPr>
-              <a:t>x=</a:t>
-            </a:r>
-            <a:r>
-              <a:rPr>
-                <a:latin typeface="Courier"/>
-              </a:rPr>
-              <a:t>genre)) </a:t>
-            </a:r>
-            <a:r>
-              <a:rPr>
-                <a:solidFill>
-                  <a:srgbClr val="4070A0"/>
-                </a:solidFill>
-                <a:latin typeface="Courier"/>
-              </a:rPr>
-              <a:t>+</a:t>
-            </a:r>
-            <a:r>
-              <a:rPr>
-                <a:latin typeface="Courier"/>
-              </a:rPr>
-              <a:t> </a:t>
-            </a:r>
-            <a:br/>
-            <a:r>
-              <a:rPr>
-                <a:latin typeface="Courier"/>
-              </a:rPr>
-              <a:t>          </a:t>
-            </a:r>
-            <a:r>
-              <a:rPr>
-                <a:solidFill>
-                  <a:srgbClr val="06287E"/>
-                </a:solidFill>
-                <a:latin typeface="Courier"/>
-              </a:rPr>
-              <a:t>geom_bar</a:t>
-            </a:r>
-            <a:r>
-              <a:rPr>
-                <a:latin typeface="Courier"/>
-              </a:rPr>
-              <a:t>(</a:t>
-            </a:r>
-            <a:r>
-              <a:rPr>
-                <a:solidFill>
-                  <a:srgbClr val="06287E"/>
-                </a:solidFill>
-                <a:latin typeface="Courier"/>
-              </a:rPr>
-              <a:t>aes</a:t>
-            </a:r>
-            <a:r>
-              <a:rPr>
-                <a:latin typeface="Courier"/>
-              </a:rPr>
-              <a:t>(</a:t>
-            </a:r>
-            <a:r>
-              <a:rPr>
-                <a:solidFill>
-                  <a:srgbClr val="7D9029"/>
-                </a:solidFill>
-                <a:latin typeface="Courier"/>
-              </a:rPr>
-              <a:t>y=</a:t>
-            </a:r>
-            <a:r>
-              <a:rPr>
-                <a:latin typeface="Courier"/>
-              </a:rPr>
-              <a:t>meanenj),</a:t>
-            </a:r>
-            <a:r>
-              <a:rPr>
-                <a:solidFill>
-                  <a:srgbClr val="7D9029"/>
-                </a:solidFill>
-                <a:latin typeface="Courier"/>
-              </a:rPr>
-              <a:t>stat=</a:t>
-            </a:r>
-            <a:r>
-              <a:rPr>
-                <a:solidFill>
-                  <a:srgbClr val="4070A0"/>
-                </a:solidFill>
-                <a:latin typeface="Courier"/>
-              </a:rPr>
-              <a:t>"identity"</a:t>
-            </a:r>
-            <a:r>
-              <a:rPr>
-                <a:latin typeface="Courier"/>
-              </a:rPr>
-              <a:t>,</a:t>
-            </a:r>
-            <a:r>
-              <a:rPr>
-                <a:solidFill>
-                  <a:srgbClr val="7D9029"/>
-                </a:solidFill>
-                <a:latin typeface="Courier"/>
-              </a:rPr>
-              <a:t>position=</a:t>
-            </a:r>
-            <a:r>
-              <a:rPr>
-                <a:solidFill>
-                  <a:srgbClr val="4070A0"/>
-                </a:solidFill>
-                <a:latin typeface="Courier"/>
-              </a:rPr>
-              <a:t>"dodge"</a:t>
-            </a:r>
-            <a:r>
-              <a:rPr>
-                <a:latin typeface="Courier"/>
-              </a:rPr>
-              <a:t>,</a:t>
-            </a:r>
-            <a:r>
-              <a:rPr>
-                <a:solidFill>
-                  <a:srgbClr val="7D9029"/>
-                </a:solidFill>
-                <a:latin typeface="Courier"/>
-              </a:rPr>
-              <a:t>col=</a:t>
-            </a:r>
-            <a:r>
-              <a:rPr>
-                <a:solidFill>
-                  <a:srgbClr val="4070A0"/>
-                </a:solidFill>
-                <a:latin typeface="Courier"/>
-              </a:rPr>
-              <a:t>"blue"</a:t>
-            </a:r>
-            <a:r>
-              <a:rPr>
-                <a:latin typeface="Courier"/>
-              </a:rPr>
-              <a:t>) </a:t>
-            </a:r>
-            <a:r>
-              <a:rPr>
-                <a:solidFill>
-                  <a:srgbClr val="4070A0"/>
-                </a:solidFill>
-                <a:latin typeface="Courier"/>
-              </a:rPr>
-              <a:t>+</a:t>
-            </a:r>
-            <a:br/>
-            <a:r>
-              <a:rPr>
-                <a:latin typeface="Courier"/>
-              </a:rPr>
-              <a:t>          </a:t>
-            </a:r>
-            <a:r>
-              <a:rPr>
-                <a:solidFill>
-                  <a:srgbClr val="06287E"/>
-                </a:solidFill>
-                <a:latin typeface="Courier"/>
-              </a:rPr>
-              <a:t>geom_bar</a:t>
-            </a:r>
-            <a:r>
-              <a:rPr>
-                <a:latin typeface="Courier"/>
-              </a:rPr>
-              <a:t>(</a:t>
-            </a:r>
-            <a:r>
-              <a:rPr>
-                <a:solidFill>
-                  <a:srgbClr val="7D9029"/>
-                </a:solidFill>
-                <a:latin typeface="Courier"/>
-              </a:rPr>
-              <a:t>position=</a:t>
-            </a:r>
-            <a:r>
-              <a:rPr>
-                <a:solidFill>
-                  <a:srgbClr val="4070A0"/>
-                </a:solidFill>
-                <a:latin typeface="Courier"/>
-              </a:rPr>
-              <a:t>"dodge"</a:t>
-            </a:r>
-            <a:r>
-              <a:rPr>
-                <a:latin typeface="Courier"/>
-              </a:rPr>
-              <a:t>) </a:t>
-            </a:r>
-            <a:r>
-              <a:rPr>
-                <a:solidFill>
-                  <a:srgbClr val="4070A0"/>
-                </a:solidFill>
-                <a:latin typeface="Courier"/>
-              </a:rPr>
-              <a:t>+</a:t>
-            </a:r>
-            <a:r>
-              <a:rPr>
-                <a:latin typeface="Courier"/>
-              </a:rPr>
-              <a:t>   </a:t>
-            </a:r>
-            <a:br/>
-            <a:r>
-              <a:rPr>
-                <a:latin typeface="Courier"/>
-              </a:rPr>
-              <a:t>          </a:t>
-            </a:r>
-            <a:r>
-              <a:rPr>
-                <a:solidFill>
-                  <a:srgbClr val="06287E"/>
-                </a:solidFill>
-                <a:latin typeface="Courier"/>
-              </a:rPr>
-              <a:t>geom_bar</a:t>
-            </a:r>
-            <a:r>
-              <a:rPr>
-                <a:latin typeface="Courier"/>
-              </a:rPr>
-              <a:t>(</a:t>
-            </a:r>
-            <a:r>
-              <a:rPr>
-                <a:solidFill>
-                  <a:srgbClr val="06287E"/>
-                </a:solidFill>
-                <a:latin typeface="Courier"/>
-              </a:rPr>
-              <a:t>aes</a:t>
-            </a:r>
-            <a:r>
-              <a:rPr>
-                <a:latin typeface="Courier"/>
-              </a:rPr>
-              <a:t>(</a:t>
-            </a:r>
-            <a:r>
-              <a:rPr>
-                <a:solidFill>
-                  <a:srgbClr val="7D9029"/>
-                </a:solidFill>
-                <a:latin typeface="Courier"/>
-              </a:rPr>
-              <a:t>y=</a:t>
-            </a:r>
-            <a:r>
-              <a:rPr>
-                <a:latin typeface="Courier"/>
-              </a:rPr>
-              <a:t>meanapp),</a:t>
-            </a:r>
-            <a:r>
-              <a:rPr>
-                <a:solidFill>
-                  <a:srgbClr val="7D9029"/>
-                </a:solidFill>
-                <a:latin typeface="Courier"/>
-              </a:rPr>
-              <a:t>stat=</a:t>
-            </a:r>
-            <a:r>
-              <a:rPr>
-                <a:solidFill>
-                  <a:srgbClr val="4070A0"/>
-                </a:solidFill>
-                <a:latin typeface="Courier"/>
-              </a:rPr>
-              <a:t>"identity"</a:t>
-            </a:r>
-            <a:r>
-              <a:rPr>
-                <a:latin typeface="Courier"/>
-              </a:rPr>
-              <a:t>,</a:t>
-            </a:r>
-            <a:r>
-              <a:rPr>
-                <a:solidFill>
-                  <a:srgbClr val="7D9029"/>
-                </a:solidFill>
-                <a:latin typeface="Courier"/>
-              </a:rPr>
-              <a:t>position=</a:t>
-            </a:r>
-            <a:r>
-              <a:rPr>
-                <a:solidFill>
-                  <a:srgbClr val="4070A0"/>
-                </a:solidFill>
-                <a:latin typeface="Courier"/>
-              </a:rPr>
-              <a:t>"dodge"</a:t>
-            </a:r>
-            <a:r>
-              <a:rPr>
-                <a:latin typeface="Courier"/>
-              </a:rPr>
-              <a:t>,</a:t>
-            </a:r>
-            <a:r>
-              <a:rPr>
-                <a:solidFill>
-                  <a:srgbClr val="7D9029"/>
-                </a:solidFill>
-                <a:latin typeface="Courier"/>
-              </a:rPr>
-              <a:t>col=</a:t>
-            </a:r>
-            <a:r>
-              <a:rPr>
-                <a:solidFill>
-                  <a:srgbClr val="4070A0"/>
-                </a:solidFill>
-                <a:latin typeface="Courier"/>
-              </a:rPr>
-              <a:t>"red"</a:t>
-            </a:r>
-            <a:r>
-              <a:rPr>
-                <a:latin typeface="Courier"/>
-              </a:rPr>
-              <a:t>)</a:t>
             </a:r>
           </a:p>
         </p:txBody>
@@ -4160,8 +3649,8 @@
         </p:blipFill>
         <p:spPr bwMode="auto">
           <a:xfrm>
-            <a:off x="3568700" y="355600"/>
-            <a:ext cx="5105400" cy="4089400"/>
+            <a:off x="3035300" y="1257300"/>
+            <a:ext cx="6121400" cy="4902200"/>
           </a:xfrm>
           <a:prstGeom prst="rect">
             <a:avLst/>
@@ -4198,293 +3687,6 @@
       </p:grpSpPr>
       <p:sp>
         <p:nvSpPr>
-          <p:cNvPr id="4" name="Text Placeholder 3"/>
-          <p:cNvSpPr>
-            <a:spLocks noGrp="1"/>
-          </p:cNvSpPr>
-          <p:nvPr>
-            <p:ph idx="2" sz="half" type="body"/>
-          </p:nvPr>
-        </p:nvSpPr>
-        <p:spPr/>
-        <p:txBody>
-          <a:bodyPr/>
-          <a:lstStyle/>
-          <a:p>
-            <a:pPr lvl="0" indent="0" marL="0">
-              <a:buNone/>
-            </a:pPr>
-          </a:p>
-          <a:p>
-            <a:pPr lvl="0" indent="0">
-              <a:buNone/>
-            </a:pPr>
-            <a:r>
-              <a:rPr>
-                <a:latin typeface="Courier"/>
-              </a:rPr>
-              <a:t>combined_df.long</a:t>
-            </a:r>
-            <a:r>
-              <a:rPr>
-                <a:solidFill>
-                  <a:srgbClr val="007020"/>
-                </a:solidFill>
-                <a:latin typeface="Courier"/>
-              </a:rPr>
-              <a:t>&lt;-</a:t>
-            </a:r>
-            <a:r>
-              <a:rPr>
-                <a:solidFill>
-                  <a:srgbClr val="06287E"/>
-                </a:solidFill>
-                <a:latin typeface="Courier"/>
-              </a:rPr>
-              <a:t>melt</a:t>
-            </a:r>
-            <a:r>
-              <a:rPr>
-                <a:latin typeface="Courier"/>
-              </a:rPr>
-              <a:t>(combined_df)</a:t>
-            </a:r>
-          </a:p>
-          <a:p>
-            <a:pPr lvl="0" indent="0">
-              <a:buNone/>
-            </a:pPr>
-            <a:r>
-              <a:rPr>
-                <a:latin typeface="Courier"/>
-              </a:rPr>
-              <a:t>## Using genre as id variables</a:t>
-            </a:r>
-          </a:p>
-          <a:p>
-            <a:pPr lvl="0" indent="0">
-              <a:buNone/>
-            </a:pPr>
-            <a:r>
-              <a:rPr>
-                <a:solidFill>
-                  <a:srgbClr val="06287E"/>
-                </a:solidFill>
-                <a:latin typeface="Courier"/>
-              </a:rPr>
-              <a:t>ggplot</a:t>
-            </a:r>
-            <a:r>
-              <a:rPr>
-                <a:latin typeface="Courier"/>
-              </a:rPr>
-              <a:t>(combined_df.long,</a:t>
-            </a:r>
-            <a:r>
-              <a:rPr>
-                <a:solidFill>
-                  <a:srgbClr val="06287E"/>
-                </a:solidFill>
-                <a:latin typeface="Courier"/>
-              </a:rPr>
-              <a:t>aes</a:t>
-            </a:r>
-            <a:r>
-              <a:rPr>
-                <a:latin typeface="Courier"/>
-              </a:rPr>
-              <a:t>(genre,value, </a:t>
-            </a:r>
-            <a:r>
-              <a:rPr>
-                <a:solidFill>
-                  <a:srgbClr val="7D9029"/>
-                </a:solidFill>
-                <a:latin typeface="Courier"/>
-              </a:rPr>
-              <a:t>fill=</a:t>
-            </a:r>
-            <a:r>
-              <a:rPr>
-                <a:latin typeface="Courier"/>
-              </a:rPr>
-              <a:t>variable))</a:t>
-            </a:r>
-            <a:r>
-              <a:rPr>
-                <a:solidFill>
-                  <a:srgbClr val="4070A0"/>
-                </a:solidFill>
-                <a:latin typeface="Courier"/>
-              </a:rPr>
-              <a:t>+</a:t>
-            </a:r>
-            <a:br/>
-            <a:r>
-              <a:rPr>
-                <a:latin typeface="Courier"/>
-              </a:rPr>
-              <a:t>     </a:t>
-            </a:r>
-            <a:r>
-              <a:rPr>
-                <a:solidFill>
-                  <a:srgbClr val="06287E"/>
-                </a:solidFill>
-                <a:latin typeface="Courier"/>
-              </a:rPr>
-              <a:t>geom_bar</a:t>
-            </a:r>
-            <a:r>
-              <a:rPr>
-                <a:latin typeface="Courier"/>
-              </a:rPr>
-              <a:t>(</a:t>
-            </a:r>
-            <a:r>
-              <a:rPr>
-                <a:solidFill>
-                  <a:srgbClr val="7D9029"/>
-                </a:solidFill>
-                <a:latin typeface="Courier"/>
-              </a:rPr>
-              <a:t>stat=</a:t>
-            </a:r>
-            <a:r>
-              <a:rPr>
-                <a:solidFill>
-                  <a:srgbClr val="4070A0"/>
-                </a:solidFill>
-                <a:latin typeface="Courier"/>
-              </a:rPr>
-              <a:t>"identity"</a:t>
-            </a:r>
-            <a:r>
-              <a:rPr>
-                <a:latin typeface="Courier"/>
-              </a:rPr>
-              <a:t>,</a:t>
-            </a:r>
-            <a:r>
-              <a:rPr>
-                <a:solidFill>
-                  <a:srgbClr val="7D9029"/>
-                </a:solidFill>
-                <a:latin typeface="Courier"/>
-              </a:rPr>
-              <a:t>position=</a:t>
-            </a:r>
-            <a:r>
-              <a:rPr>
-                <a:solidFill>
-                  <a:srgbClr val="4070A0"/>
-                </a:solidFill>
-                <a:latin typeface="Courier"/>
-              </a:rPr>
-              <a:t>"dodge"</a:t>
-            </a:r>
-            <a:r>
-              <a:rPr>
-                <a:latin typeface="Courier"/>
-              </a:rPr>
-              <a:t>)</a:t>
-            </a:r>
-            <a:r>
-              <a:rPr>
-                <a:solidFill>
-                  <a:srgbClr val="4070A0"/>
-                </a:solidFill>
-                <a:latin typeface="Courier"/>
-              </a:rPr>
-              <a:t>+</a:t>
-            </a:r>
-            <a:r>
-              <a:rPr>
-                <a:solidFill>
-                  <a:srgbClr val="06287E"/>
-                </a:solidFill>
-                <a:latin typeface="Courier"/>
-              </a:rPr>
-              <a:t>facet_wrap</a:t>
-            </a:r>
-            <a:r>
-              <a:rPr>
-                <a:latin typeface="Courier"/>
-              </a:rPr>
-              <a:t>(</a:t>
-            </a:r>
-            <a:r>
-              <a:rPr>
-                <a:solidFill>
-                  <a:srgbClr val="4070A0"/>
-                </a:solidFill>
-                <a:latin typeface="Courier"/>
-              </a:rPr>
-              <a:t>~</a:t>
-            </a:r>
-            <a:r>
-              <a:rPr>
-                <a:latin typeface="Courier"/>
-              </a:rPr>
-              <a:t>genre)</a:t>
-            </a:r>
-          </a:p>
-        </p:txBody>
-      </p:sp>
-      <p:pic>
-        <p:nvPicPr>
-          <p:cNvPr descr="Slides_files/figure-pptx/unnamed-chunk-24-2.png" id="0" name="Picture 1"/>
-          <p:cNvPicPr>
-            <a:picLocks noGrp="1" noChangeAspect="1"/>
-          </p:cNvPicPr>
-          <p:nvPr/>
-        </p:nvPicPr>
-        <p:blipFill>
-          <a:blip r:embed="rId2"/>
-          <a:stretch>
-            <a:fillRect/>
-          </a:stretch>
-        </p:blipFill>
-        <p:spPr bwMode="auto">
-          <a:xfrm>
-            <a:off x="3568700" y="355600"/>
-            <a:ext cx="5105400" cy="4089400"/>
-          </a:xfrm>
-          <a:prstGeom prst="rect">
-            <a:avLst/>
-          </a:prstGeom>
-          <a:noFill/>
-          <a:ln w="9525">
-            <a:noFill/>
-            <a:headEnd/>
-            <a:tailEnd/>
-          </a:ln>
-        </p:spPr>
-      </p:pic>
-    </p:spTree>
-  </p:cSld>
-</p:sld>
-</file>
-
-<file path=ppt/slides/slide17.xml><?xml version="1.0" encoding="utf-8"?>
-<p:sld xmlns:a="http://schemas.openxmlformats.org/drawingml/2006/main" xmlns:r="http://schemas.openxmlformats.org/officeDocument/2006/relationships" xmlns:p="http://schemas.openxmlformats.org/presentationml/2006/main">
-  <p:cSld>
-    <p:spTree>
-      <p:nvGrpSpPr>
-        <p:cNvPr id="1" name=""/>
-        <p:cNvGrpSpPr/>
-        <p:nvPr/>
-      </p:nvGrpSpPr>
-      <p:grpSpPr>
-        <a:xfrm>
-          <a:off x="0" y="0"/>
-          <a:ext cx="0" cy="0"/>
-          <a:chOff x="0" y="0"/>
-          <a:chExt cx="0" cy="0"/>
-        </a:xfrm>
-      </p:grpSpPr>
-      <p:sp>
-        <p:nvSpPr>
           <p:cNvPr id="2" name="Title 1">
             <a:extLst>
               <a:ext uri="{FF2B5EF4-FFF2-40B4-BE49-F238E27FC236}">
@@ -4509,57 +3711,7 @@
             </a:pPr>
             <a:r>
               <a:rPr/>
-              <a:t>Questions</a:t>
-            </a:r>
-          </a:p>
-        </p:txBody>
-      </p:sp>
-      <p:sp>
-        <p:nvSpPr>
-          <p:cNvPr id="3" name="Content Placeholder 2">
-            <a:extLst>
-              <a:ext uri="{FF2B5EF4-FFF2-40B4-BE49-F238E27FC236}">
-                <a16:creationId xmlns:a16="http://schemas.microsoft.com/office/drawing/2014/main" id="{6DDEDE47-A0B3-B021-6D78-709CA34A1D24}"/>
-              </a:ext>
-            </a:extLst>
-          </p:cNvPr>
-          <p:cNvSpPr>
-            <a:spLocks noGrp="1"/>
-          </p:cNvSpPr>
-          <p:nvPr>
-            <p:ph idx="1"/>
-          </p:nvPr>
-        </p:nvSpPr>
-        <p:spPr/>
-        <p:txBody>
-          <a:bodyPr/>
-          <a:lstStyle/>
-          <a:p>
-            <a:pPr lvl="0"/>
-            <a:r>
-              <a:rPr/>
-              <a:t>Which movies were top rated in appreciation / enjoyment?</a:t>
-            </a:r>
-          </a:p>
-          <a:p>
-            <a:pPr lvl="0"/>
-            <a:r>
-              <a:rPr/>
-              <a:t>Which genre have the highest appreciation rating?</a:t>
-            </a:r>
-          </a:p>
-          <a:p>
-            <a:pPr lvl="0"/>
-            <a:r>
-              <a:rPr/>
-              <a:t>Which genre have the highest enjoyment rating? which genre cost more to produce? dome which genre has the highest income? Which sex contributes more to that income. Mutate each film to multiply ratio by income. Then Summarize by genre = true. Repeat for male so you can see both contributions. **We still have the classical-ness and popularity to mess around with.</a:t>
-            </a:r>
-          </a:p>
-          <a:p>
-            <a:pPr lvl="0"/>
-            <a:r>
-              <a:rPr/>
-              <a:t>Gender and how it affects budget. (Which gender contributes more to the gross of each genre- after budge/gross | pink blue) apreciation per genre enjoyment and genre</a:t>
+              <a:t>End.</a:t>
             </a:r>
           </a:p>
         </p:txBody>

</xml_diff>